<commit_message>
presentation.pptx added almost done
</commit_message>
<xml_diff>
--- a/presentation.pptx
+++ b/presentation.pptx
@@ -9,7 +9,12 @@
     <p:sldId id="258" r:id="rId3"/>
     <p:sldId id="260" r:id="rId4"/>
     <p:sldId id="259" r:id="rId5"/>
-    <p:sldId id="257" r:id="rId6"/>
+    <p:sldId id="261" r:id="rId6"/>
+    <p:sldId id="262" r:id="rId7"/>
+    <p:sldId id="263" r:id="rId8"/>
+    <p:sldId id="264" r:id="rId9"/>
+    <p:sldId id="265" r:id="rId10"/>
+    <p:sldId id="257" r:id="rId11"/>
   </p:sldIdLst>
   <p:sldSz cx="12192000" cy="6858000"/>
   <p:notesSz cx="6858000" cy="9144000"/>
@@ -117,6 +122,11 @@
             <p14:sldId id="258"/>
             <p14:sldId id="260"/>
             <p14:sldId id="259"/>
+            <p14:sldId id="261"/>
+            <p14:sldId id="262"/>
+            <p14:sldId id="263"/>
+            <p14:sldId id="264"/>
+            <p14:sldId id="265"/>
           </p14:sldIdLst>
         </p14:section>
         <p14:section name="Text" id="{F2816552-440F-4E9A-9F57-0C73F5306457}">
@@ -128,6 +138,427 @@
     </p:ext>
   </p:extLst>
 </p:presentation>
+</file>
+
+<file path=ppt/revisionInfo.xml><?xml version="1.0" encoding="utf-8"?>
+<p1510:revInfo xmlns:a="http://schemas.openxmlformats.org/drawingml/2006/main" xmlns:r="http://schemas.openxmlformats.org/officeDocument/2006/relationships" xmlns:p1510="http://schemas.microsoft.com/office/powerpoint/2015/10/main">
+  <p1510:revLst>
+    <p1510:client id="{2FCEFF15-414C-45B8-8E2B-EA31F7FDEAE7}" v="12" dt="2023-01-17T18:47:12.082"/>
+  </p1510:revLst>
+</p1510:revInfo>
+</file>
+
+<file path=ppt/changesInfos/changesInfo1.xml><?xml version="1.0" encoding="utf-8"?>
+<pc:chgInfo xmlns:a="http://schemas.openxmlformats.org/drawingml/2006/main" xmlns:r="http://schemas.openxmlformats.org/officeDocument/2006/relationships" xmlns:ac="http://schemas.microsoft.com/office/drawing/2013/main/command" xmlns:pc="http://schemas.microsoft.com/office/powerpoint/2013/main/command">
+  <pc:docChgLst>
+    <pc:chgData name="Vera Lissa" userId="b5a833c348c5d4cd" providerId="LiveId" clId="{2FCEFF15-414C-45B8-8E2B-EA31F7FDEAE7}"/>
+    <pc:docChg chg="custSel addSld modSld modSection">
+      <pc:chgData name="Vera Lissa" userId="b5a833c348c5d4cd" providerId="LiveId" clId="{2FCEFF15-414C-45B8-8E2B-EA31F7FDEAE7}" dt="2023-01-17T18:48:47.918" v="418" actId="14100"/>
+      <pc:docMkLst>
+        <pc:docMk/>
+      </pc:docMkLst>
+      <pc:sldChg chg="addSp delSp delDesignElem">
+        <pc:chgData name="Vera Lissa" userId="b5a833c348c5d4cd" providerId="LiveId" clId="{2FCEFF15-414C-45B8-8E2B-EA31F7FDEAE7}" dt="2023-01-17T18:47:12.082" v="369"/>
+        <pc:sldMkLst>
+          <pc:docMk/>
+          <pc:sldMk cId="2347019164" sldId="257"/>
+        </pc:sldMkLst>
+        <pc:spChg chg="add del">
+          <ac:chgData name="Vera Lissa" userId="b5a833c348c5d4cd" providerId="LiveId" clId="{2FCEFF15-414C-45B8-8E2B-EA31F7FDEAE7}" dt="2023-01-17T18:47:12.082" v="369"/>
+          <ac:spMkLst>
+            <pc:docMk/>
+            <pc:sldMk cId="2347019164" sldId="257"/>
+            <ac:spMk id="12" creationId="{11CAC6F2-0806-417B-BF5D-5AEF6195FA49}"/>
+          </ac:spMkLst>
+        </pc:spChg>
+        <pc:spChg chg="add del">
+          <ac:chgData name="Vera Lissa" userId="b5a833c348c5d4cd" providerId="LiveId" clId="{2FCEFF15-414C-45B8-8E2B-EA31F7FDEAE7}" dt="2023-01-17T18:47:12.082" v="369"/>
+          <ac:spMkLst>
+            <pc:docMk/>
+            <pc:sldMk cId="2347019164" sldId="257"/>
+            <ac:spMk id="14" creationId="{D4723B02-0AAB-4F6E-BA41-8ED99D559D93}"/>
+          </ac:spMkLst>
+        </pc:spChg>
+      </pc:sldChg>
+      <pc:sldChg chg="addSp delSp modSp mod delDesignElem">
+        <pc:chgData name="Vera Lissa" userId="b5a833c348c5d4cd" providerId="LiveId" clId="{2FCEFF15-414C-45B8-8E2B-EA31F7FDEAE7}" dt="2023-01-17T18:47:12.082" v="369"/>
+        <pc:sldMkLst>
+          <pc:docMk/>
+          <pc:sldMk cId="2595653783" sldId="258"/>
+        </pc:sldMkLst>
+        <pc:spChg chg="mod">
+          <ac:chgData name="Vera Lissa" userId="b5a833c348c5d4cd" providerId="LiveId" clId="{2FCEFF15-414C-45B8-8E2B-EA31F7FDEAE7}" dt="2023-01-17T16:38:49.096" v="11" actId="20577"/>
+          <ac:spMkLst>
+            <pc:docMk/>
+            <pc:sldMk cId="2595653783" sldId="258"/>
+            <ac:spMk id="3" creationId="{724AAB87-63A0-7210-773B-DFAE8FE87EB6}"/>
+          </ac:spMkLst>
+        </pc:spChg>
+        <pc:spChg chg="add del">
+          <ac:chgData name="Vera Lissa" userId="b5a833c348c5d4cd" providerId="LiveId" clId="{2FCEFF15-414C-45B8-8E2B-EA31F7FDEAE7}" dt="2023-01-17T18:47:12.082" v="369"/>
+          <ac:spMkLst>
+            <pc:docMk/>
+            <pc:sldMk cId="2595653783" sldId="258"/>
+            <ac:spMk id="5" creationId="{01109B5D-BC35-4376-98A2-F53B03E4E1B4}"/>
+          </ac:spMkLst>
+        </pc:spChg>
+        <pc:spChg chg="add del">
+          <ac:chgData name="Vera Lissa" userId="b5a833c348c5d4cd" providerId="LiveId" clId="{2FCEFF15-414C-45B8-8E2B-EA31F7FDEAE7}" dt="2023-01-17T18:47:12.082" v="369"/>
+          <ac:spMkLst>
+            <pc:docMk/>
+            <pc:sldMk cId="2595653783" sldId="258"/>
+            <ac:spMk id="6" creationId="{94D90C11-98A3-40E3-B04C-A3025D6458A3}"/>
+          </ac:spMkLst>
+        </pc:spChg>
+        <pc:spChg chg="add del">
+          <ac:chgData name="Vera Lissa" userId="b5a833c348c5d4cd" providerId="LiveId" clId="{2FCEFF15-414C-45B8-8E2B-EA31F7FDEAE7}" dt="2023-01-17T18:47:12.082" v="369"/>
+          <ac:spMkLst>
+            <pc:docMk/>
+            <pc:sldMk cId="2595653783" sldId="258"/>
+            <ac:spMk id="7" creationId="{A3B28FB1-97C9-4A9E-A45B-356508C2C38B}"/>
+          </ac:spMkLst>
+        </pc:spChg>
+      </pc:sldChg>
+      <pc:sldChg chg="addSp delSp delDesignElem">
+        <pc:chgData name="Vera Lissa" userId="b5a833c348c5d4cd" providerId="LiveId" clId="{2FCEFF15-414C-45B8-8E2B-EA31F7FDEAE7}" dt="2023-01-17T18:47:12.082" v="369"/>
+        <pc:sldMkLst>
+          <pc:docMk/>
+          <pc:sldMk cId="2208403561" sldId="259"/>
+        </pc:sldMkLst>
+        <pc:spChg chg="add del">
+          <ac:chgData name="Vera Lissa" userId="b5a833c348c5d4cd" providerId="LiveId" clId="{2FCEFF15-414C-45B8-8E2B-EA31F7FDEAE7}" dt="2023-01-17T18:47:12.082" v="369"/>
+          <ac:spMkLst>
+            <pc:docMk/>
+            <pc:sldMk cId="2208403561" sldId="259"/>
+            <ac:spMk id="8" creationId="{01109B5D-BC35-4376-98A2-F53B03E4E1B4}"/>
+          </ac:spMkLst>
+        </pc:spChg>
+        <pc:spChg chg="add del">
+          <ac:chgData name="Vera Lissa" userId="b5a833c348c5d4cd" providerId="LiveId" clId="{2FCEFF15-414C-45B8-8E2B-EA31F7FDEAE7}" dt="2023-01-17T18:47:12.082" v="369"/>
+          <ac:spMkLst>
+            <pc:docMk/>
+            <pc:sldMk cId="2208403561" sldId="259"/>
+            <ac:spMk id="10" creationId="{94D90C11-98A3-40E3-B04C-A3025D6458A3}"/>
+          </ac:spMkLst>
+        </pc:spChg>
+        <pc:spChg chg="add del">
+          <ac:chgData name="Vera Lissa" userId="b5a833c348c5d4cd" providerId="LiveId" clId="{2FCEFF15-414C-45B8-8E2B-EA31F7FDEAE7}" dt="2023-01-17T18:47:12.082" v="369"/>
+          <ac:spMkLst>
+            <pc:docMk/>
+            <pc:sldMk cId="2208403561" sldId="259"/>
+            <ac:spMk id="12" creationId="{A3B28FB1-97C9-4A9E-A45B-356508C2C38B}"/>
+          </ac:spMkLst>
+        </pc:spChg>
+      </pc:sldChg>
+      <pc:sldChg chg="addSp delSp delDesignElem">
+        <pc:chgData name="Vera Lissa" userId="b5a833c348c5d4cd" providerId="LiveId" clId="{2FCEFF15-414C-45B8-8E2B-EA31F7FDEAE7}" dt="2023-01-17T18:47:12.082" v="369"/>
+        <pc:sldMkLst>
+          <pc:docMk/>
+          <pc:sldMk cId="3956636464" sldId="260"/>
+        </pc:sldMkLst>
+        <pc:spChg chg="add del">
+          <ac:chgData name="Vera Lissa" userId="b5a833c348c5d4cd" providerId="LiveId" clId="{2FCEFF15-414C-45B8-8E2B-EA31F7FDEAE7}" dt="2023-01-17T18:47:12.082" v="369"/>
+          <ac:spMkLst>
+            <pc:docMk/>
+            <pc:sldMk cId="3956636464" sldId="260"/>
+            <ac:spMk id="8" creationId="{01109B5D-BC35-4376-98A2-F53B03E4E1B4}"/>
+          </ac:spMkLst>
+        </pc:spChg>
+        <pc:spChg chg="add del">
+          <ac:chgData name="Vera Lissa" userId="b5a833c348c5d4cd" providerId="LiveId" clId="{2FCEFF15-414C-45B8-8E2B-EA31F7FDEAE7}" dt="2023-01-17T18:47:12.082" v="369"/>
+          <ac:spMkLst>
+            <pc:docMk/>
+            <pc:sldMk cId="3956636464" sldId="260"/>
+            <ac:spMk id="10" creationId="{94D90C11-98A3-40E3-B04C-A3025D6458A3}"/>
+          </ac:spMkLst>
+        </pc:spChg>
+        <pc:spChg chg="add del">
+          <ac:chgData name="Vera Lissa" userId="b5a833c348c5d4cd" providerId="LiveId" clId="{2FCEFF15-414C-45B8-8E2B-EA31F7FDEAE7}" dt="2023-01-17T18:47:12.082" v="369"/>
+          <ac:spMkLst>
+            <pc:docMk/>
+            <pc:sldMk cId="3956636464" sldId="260"/>
+            <ac:spMk id="12" creationId="{A3B28FB1-97C9-4A9E-A45B-356508C2C38B}"/>
+          </ac:spMkLst>
+        </pc:spChg>
+      </pc:sldChg>
+      <pc:sldChg chg="addSp delSp modSp new mod setBg setClrOvrMap delDesignElem">
+        <pc:chgData name="Vera Lissa" userId="b5a833c348c5d4cd" providerId="LiveId" clId="{2FCEFF15-414C-45B8-8E2B-EA31F7FDEAE7}" dt="2023-01-17T18:47:12.082" v="369"/>
+        <pc:sldMkLst>
+          <pc:docMk/>
+          <pc:sldMk cId="3113367059" sldId="261"/>
+        </pc:sldMkLst>
+        <pc:spChg chg="mod">
+          <ac:chgData name="Vera Lissa" userId="b5a833c348c5d4cd" providerId="LiveId" clId="{2FCEFF15-414C-45B8-8E2B-EA31F7FDEAE7}" dt="2023-01-17T16:55:19.331" v="41" actId="113"/>
+          <ac:spMkLst>
+            <pc:docMk/>
+            <pc:sldMk cId="3113367059" sldId="261"/>
+            <ac:spMk id="2" creationId="{B2CE05E5-6DD1-AFA9-60A7-6D6DA3344497}"/>
+          </ac:spMkLst>
+        </pc:spChg>
+        <pc:spChg chg="mod">
+          <ac:chgData name="Vera Lissa" userId="b5a833c348c5d4cd" providerId="LiveId" clId="{2FCEFF15-414C-45B8-8E2B-EA31F7FDEAE7}" dt="2023-01-17T16:55:33.246" v="42" actId="1076"/>
+          <ac:spMkLst>
+            <pc:docMk/>
+            <pc:sldMk cId="3113367059" sldId="261"/>
+            <ac:spMk id="3" creationId="{7E7C716A-6B7B-9916-F470-6925D743F243}"/>
+          </ac:spMkLst>
+        </pc:spChg>
+        <pc:spChg chg="add del">
+          <ac:chgData name="Vera Lissa" userId="b5a833c348c5d4cd" providerId="LiveId" clId="{2FCEFF15-414C-45B8-8E2B-EA31F7FDEAE7}" dt="2023-01-17T18:47:12.082" v="369"/>
+          <ac:spMkLst>
+            <pc:docMk/>
+            <pc:sldMk cId="3113367059" sldId="261"/>
+            <ac:spMk id="8" creationId="{01109B5D-BC35-4376-98A2-F53B03E4E1B4}"/>
+          </ac:spMkLst>
+        </pc:spChg>
+        <pc:spChg chg="add del">
+          <ac:chgData name="Vera Lissa" userId="b5a833c348c5d4cd" providerId="LiveId" clId="{2FCEFF15-414C-45B8-8E2B-EA31F7FDEAE7}" dt="2023-01-17T18:47:12.082" v="369"/>
+          <ac:spMkLst>
+            <pc:docMk/>
+            <pc:sldMk cId="3113367059" sldId="261"/>
+            <ac:spMk id="10" creationId="{94D90C11-98A3-40E3-B04C-A3025D6458A3}"/>
+          </ac:spMkLst>
+        </pc:spChg>
+        <pc:spChg chg="add del">
+          <ac:chgData name="Vera Lissa" userId="b5a833c348c5d4cd" providerId="LiveId" clId="{2FCEFF15-414C-45B8-8E2B-EA31F7FDEAE7}" dt="2023-01-17T18:47:12.082" v="369"/>
+          <ac:spMkLst>
+            <pc:docMk/>
+            <pc:sldMk cId="3113367059" sldId="261"/>
+            <ac:spMk id="12" creationId="{A3B28FB1-97C9-4A9E-A45B-356508C2C38B}"/>
+          </ac:spMkLst>
+        </pc:spChg>
+      </pc:sldChg>
+      <pc:sldChg chg="addSp delSp modSp new mod setBg setClrOvrMap delDesignElem">
+        <pc:chgData name="Vera Lissa" userId="b5a833c348c5d4cd" providerId="LiveId" clId="{2FCEFF15-414C-45B8-8E2B-EA31F7FDEAE7}" dt="2023-01-17T18:47:12.082" v="369"/>
+        <pc:sldMkLst>
+          <pc:docMk/>
+          <pc:sldMk cId="3782695643" sldId="262"/>
+        </pc:sldMkLst>
+        <pc:spChg chg="mod">
+          <ac:chgData name="Vera Lissa" userId="b5a833c348c5d4cd" providerId="LiveId" clId="{2FCEFF15-414C-45B8-8E2B-EA31F7FDEAE7}" dt="2023-01-17T16:56:53.213" v="50" actId="1076"/>
+          <ac:spMkLst>
+            <pc:docMk/>
+            <pc:sldMk cId="3782695643" sldId="262"/>
+            <ac:spMk id="2" creationId="{F243D50A-80AA-E5D9-F176-E05724765F9D}"/>
+          </ac:spMkLst>
+        </pc:spChg>
+        <pc:spChg chg="del mod">
+          <ac:chgData name="Vera Lissa" userId="b5a833c348c5d4cd" providerId="LiveId" clId="{2FCEFF15-414C-45B8-8E2B-EA31F7FDEAE7}" dt="2023-01-17T16:58:27.938" v="52"/>
+          <ac:spMkLst>
+            <pc:docMk/>
+            <pc:sldMk cId="3782695643" sldId="262"/>
+            <ac:spMk id="3" creationId="{CF067968-CAC8-4A61-EA07-3F61624F6559}"/>
+          </ac:spMkLst>
+        </pc:spChg>
+        <pc:spChg chg="add del">
+          <ac:chgData name="Vera Lissa" userId="b5a833c348c5d4cd" providerId="LiveId" clId="{2FCEFF15-414C-45B8-8E2B-EA31F7FDEAE7}" dt="2023-01-17T18:47:12.082" v="369"/>
+          <ac:spMkLst>
+            <pc:docMk/>
+            <pc:sldMk cId="3782695643" sldId="262"/>
+            <ac:spMk id="8" creationId="{01109B5D-BC35-4376-98A2-F53B03E4E1B4}"/>
+          </ac:spMkLst>
+        </pc:spChg>
+        <pc:spChg chg="add del">
+          <ac:chgData name="Vera Lissa" userId="b5a833c348c5d4cd" providerId="LiveId" clId="{2FCEFF15-414C-45B8-8E2B-EA31F7FDEAE7}" dt="2023-01-17T18:47:12.082" v="369"/>
+          <ac:spMkLst>
+            <pc:docMk/>
+            <pc:sldMk cId="3782695643" sldId="262"/>
+            <ac:spMk id="10" creationId="{94D90C11-98A3-40E3-B04C-A3025D6458A3}"/>
+          </ac:spMkLst>
+        </pc:spChg>
+        <pc:spChg chg="add del">
+          <ac:chgData name="Vera Lissa" userId="b5a833c348c5d4cd" providerId="LiveId" clId="{2FCEFF15-414C-45B8-8E2B-EA31F7FDEAE7}" dt="2023-01-17T18:47:12.082" v="369"/>
+          <ac:spMkLst>
+            <pc:docMk/>
+            <pc:sldMk cId="3782695643" sldId="262"/>
+            <ac:spMk id="12" creationId="{A3B28FB1-97C9-4A9E-A45B-356508C2C38B}"/>
+          </ac:spMkLst>
+        </pc:spChg>
+        <pc:picChg chg="add mod">
+          <ac:chgData name="Vera Lissa" userId="b5a833c348c5d4cd" providerId="LiveId" clId="{2FCEFF15-414C-45B8-8E2B-EA31F7FDEAE7}" dt="2023-01-17T17:13:15.249" v="114" actId="14100"/>
+          <ac:picMkLst>
+            <pc:docMk/>
+            <pc:sldMk cId="3782695643" sldId="262"/>
+            <ac:picMk id="5" creationId="{6484BF81-DE68-A587-9A30-C5F8B3F54B33}"/>
+          </ac:picMkLst>
+        </pc:picChg>
+        <pc:picChg chg="add mod">
+          <ac:chgData name="Vera Lissa" userId="b5a833c348c5d4cd" providerId="LiveId" clId="{2FCEFF15-414C-45B8-8E2B-EA31F7FDEAE7}" dt="2023-01-17T17:13:07.892" v="111" actId="14100"/>
+          <ac:picMkLst>
+            <pc:docMk/>
+            <pc:sldMk cId="3782695643" sldId="262"/>
+            <ac:picMk id="7" creationId="{7C77D299-2EDD-9C84-47D5-BE127A2797B0}"/>
+          </ac:picMkLst>
+        </pc:picChg>
+        <pc:picChg chg="add mod">
+          <ac:chgData name="Vera Lissa" userId="b5a833c348c5d4cd" providerId="LiveId" clId="{2FCEFF15-414C-45B8-8E2B-EA31F7FDEAE7}" dt="2023-01-17T17:11:51.188" v="100" actId="1076"/>
+          <ac:picMkLst>
+            <pc:docMk/>
+            <pc:sldMk cId="3782695643" sldId="262"/>
+            <ac:picMk id="11" creationId="{35639604-7849-2EC4-669B-D59431E5566B}"/>
+          </ac:picMkLst>
+        </pc:picChg>
+        <pc:picChg chg="add mod">
+          <ac:chgData name="Vera Lissa" userId="b5a833c348c5d4cd" providerId="LiveId" clId="{2FCEFF15-414C-45B8-8E2B-EA31F7FDEAE7}" dt="2023-01-17T17:12:08.268" v="103" actId="14100"/>
+          <ac:picMkLst>
+            <pc:docMk/>
+            <pc:sldMk cId="3782695643" sldId="262"/>
+            <ac:picMk id="14" creationId="{4A6CEE77-66FF-8E47-3642-82367C1F03E9}"/>
+          </ac:picMkLst>
+        </pc:picChg>
+        <pc:picChg chg="add mod">
+          <ac:chgData name="Vera Lissa" userId="b5a833c348c5d4cd" providerId="LiveId" clId="{2FCEFF15-414C-45B8-8E2B-EA31F7FDEAE7}" dt="2023-01-17T17:13:00.914" v="110" actId="14100"/>
+          <ac:picMkLst>
+            <pc:docMk/>
+            <pc:sldMk cId="3782695643" sldId="262"/>
+            <ac:picMk id="16" creationId="{29E397B8-BB90-5A61-21F4-76A663E4C998}"/>
+          </ac:picMkLst>
+        </pc:picChg>
+      </pc:sldChg>
+      <pc:sldChg chg="addSp delSp modSp new mod setBg setClrOvrMap delDesignElem">
+        <pc:chgData name="Vera Lissa" userId="b5a833c348c5d4cd" providerId="LiveId" clId="{2FCEFF15-414C-45B8-8E2B-EA31F7FDEAE7}" dt="2023-01-17T18:47:12.082" v="369"/>
+        <pc:sldMkLst>
+          <pc:docMk/>
+          <pc:sldMk cId="1546261090" sldId="263"/>
+        </pc:sldMkLst>
+        <pc:spChg chg="mod">
+          <ac:chgData name="Vera Lissa" userId="b5a833c348c5d4cd" providerId="LiveId" clId="{2FCEFF15-414C-45B8-8E2B-EA31F7FDEAE7}" dt="2023-01-17T17:14:20.880" v="121" actId="113"/>
+          <ac:spMkLst>
+            <pc:docMk/>
+            <pc:sldMk cId="1546261090" sldId="263"/>
+            <ac:spMk id="2" creationId="{8A03DEFD-E491-B993-57A0-99260FEDABED}"/>
+          </ac:spMkLst>
+        </pc:spChg>
+        <pc:spChg chg="mod">
+          <ac:chgData name="Vera Lissa" userId="b5a833c348c5d4cd" providerId="LiveId" clId="{2FCEFF15-414C-45B8-8E2B-EA31F7FDEAE7}" dt="2023-01-17T17:14:47.313" v="124" actId="14100"/>
+          <ac:spMkLst>
+            <pc:docMk/>
+            <pc:sldMk cId="1546261090" sldId="263"/>
+            <ac:spMk id="3" creationId="{AD6040EA-249F-3DF4-AFE3-7FF05C701D8F}"/>
+          </ac:spMkLst>
+        </pc:spChg>
+        <pc:spChg chg="add del">
+          <ac:chgData name="Vera Lissa" userId="b5a833c348c5d4cd" providerId="LiveId" clId="{2FCEFF15-414C-45B8-8E2B-EA31F7FDEAE7}" dt="2023-01-17T18:47:12.082" v="369"/>
+          <ac:spMkLst>
+            <pc:docMk/>
+            <pc:sldMk cId="1546261090" sldId="263"/>
+            <ac:spMk id="8" creationId="{01109B5D-BC35-4376-98A2-F53B03E4E1B4}"/>
+          </ac:spMkLst>
+        </pc:spChg>
+        <pc:spChg chg="add del">
+          <ac:chgData name="Vera Lissa" userId="b5a833c348c5d4cd" providerId="LiveId" clId="{2FCEFF15-414C-45B8-8E2B-EA31F7FDEAE7}" dt="2023-01-17T18:47:12.082" v="369"/>
+          <ac:spMkLst>
+            <pc:docMk/>
+            <pc:sldMk cId="1546261090" sldId="263"/>
+            <ac:spMk id="10" creationId="{94D90C11-98A3-40E3-B04C-A3025D6458A3}"/>
+          </ac:spMkLst>
+        </pc:spChg>
+        <pc:spChg chg="add del">
+          <ac:chgData name="Vera Lissa" userId="b5a833c348c5d4cd" providerId="LiveId" clId="{2FCEFF15-414C-45B8-8E2B-EA31F7FDEAE7}" dt="2023-01-17T18:47:12.082" v="369"/>
+          <ac:spMkLst>
+            <pc:docMk/>
+            <pc:sldMk cId="1546261090" sldId="263"/>
+            <ac:spMk id="12" creationId="{A3B28FB1-97C9-4A9E-A45B-356508C2C38B}"/>
+          </ac:spMkLst>
+        </pc:spChg>
+      </pc:sldChg>
+      <pc:sldChg chg="addSp delSp modSp new mod setBg setClrOvrMap delDesignElem">
+        <pc:chgData name="Vera Lissa" userId="b5a833c348c5d4cd" providerId="LiveId" clId="{2FCEFF15-414C-45B8-8E2B-EA31F7FDEAE7}" dt="2023-01-17T18:47:12.082" v="369"/>
+        <pc:sldMkLst>
+          <pc:docMk/>
+          <pc:sldMk cId="1756463326" sldId="264"/>
+        </pc:sldMkLst>
+        <pc:spChg chg="mod">
+          <ac:chgData name="Vera Lissa" userId="b5a833c348c5d4cd" providerId="LiveId" clId="{2FCEFF15-414C-45B8-8E2B-EA31F7FDEAE7}" dt="2023-01-17T18:39:19.647" v="143" actId="113"/>
+          <ac:spMkLst>
+            <pc:docMk/>
+            <pc:sldMk cId="1756463326" sldId="264"/>
+            <ac:spMk id="2" creationId="{FC1D0639-0367-DE71-8941-06A76C3D7FDF}"/>
+          </ac:spMkLst>
+        </pc:spChg>
+        <pc:spChg chg="mod">
+          <ac:chgData name="Vera Lissa" userId="b5a833c348c5d4cd" providerId="LiveId" clId="{2FCEFF15-414C-45B8-8E2B-EA31F7FDEAE7}" dt="2023-01-17T18:46:40.944" v="358" actId="20577"/>
+          <ac:spMkLst>
+            <pc:docMk/>
+            <pc:sldMk cId="1756463326" sldId="264"/>
+            <ac:spMk id="3" creationId="{C61E4F74-06C2-D283-8EC2-7AE9FBC1E062}"/>
+          </ac:spMkLst>
+        </pc:spChg>
+        <pc:spChg chg="add del">
+          <ac:chgData name="Vera Lissa" userId="b5a833c348c5d4cd" providerId="LiveId" clId="{2FCEFF15-414C-45B8-8E2B-EA31F7FDEAE7}" dt="2023-01-17T18:47:12.082" v="369"/>
+          <ac:spMkLst>
+            <pc:docMk/>
+            <pc:sldMk cId="1756463326" sldId="264"/>
+            <ac:spMk id="8" creationId="{01109B5D-BC35-4376-98A2-F53B03E4E1B4}"/>
+          </ac:spMkLst>
+        </pc:spChg>
+        <pc:spChg chg="add del">
+          <ac:chgData name="Vera Lissa" userId="b5a833c348c5d4cd" providerId="LiveId" clId="{2FCEFF15-414C-45B8-8E2B-EA31F7FDEAE7}" dt="2023-01-17T18:47:12.082" v="369"/>
+          <ac:spMkLst>
+            <pc:docMk/>
+            <pc:sldMk cId="1756463326" sldId="264"/>
+            <ac:spMk id="10" creationId="{94D90C11-98A3-40E3-B04C-A3025D6458A3}"/>
+          </ac:spMkLst>
+        </pc:spChg>
+        <pc:spChg chg="add del">
+          <ac:chgData name="Vera Lissa" userId="b5a833c348c5d4cd" providerId="LiveId" clId="{2FCEFF15-414C-45B8-8E2B-EA31F7FDEAE7}" dt="2023-01-17T18:47:12.082" v="369"/>
+          <ac:spMkLst>
+            <pc:docMk/>
+            <pc:sldMk cId="1756463326" sldId="264"/>
+            <ac:spMk id="12" creationId="{A3B28FB1-97C9-4A9E-A45B-356508C2C38B}"/>
+          </ac:spMkLst>
+        </pc:spChg>
+      </pc:sldChg>
+      <pc:sldChg chg="addSp modSp new mod setBg setClrOvrMap">
+        <pc:chgData name="Vera Lissa" userId="b5a833c348c5d4cd" providerId="LiveId" clId="{2FCEFF15-414C-45B8-8E2B-EA31F7FDEAE7}" dt="2023-01-17T18:48:47.918" v="418" actId="14100"/>
+        <pc:sldMkLst>
+          <pc:docMk/>
+          <pc:sldMk cId="1109460163" sldId="265"/>
+        </pc:sldMkLst>
+        <pc:spChg chg="mod">
+          <ac:chgData name="Vera Lissa" userId="b5a833c348c5d4cd" providerId="LiveId" clId="{2FCEFF15-414C-45B8-8E2B-EA31F7FDEAE7}" dt="2023-01-17T18:48:01.550" v="413" actId="1076"/>
+          <ac:spMkLst>
+            <pc:docMk/>
+            <pc:sldMk cId="1109460163" sldId="265"/>
+            <ac:spMk id="2" creationId="{6DF1C0CF-B1A7-B0FD-0732-4B5A575F7CA9}"/>
+          </ac:spMkLst>
+        </pc:spChg>
+        <pc:spChg chg="mod">
+          <ac:chgData name="Vera Lissa" userId="b5a833c348c5d4cd" providerId="LiveId" clId="{2FCEFF15-414C-45B8-8E2B-EA31F7FDEAE7}" dt="2023-01-17T18:48:47.918" v="418" actId="14100"/>
+          <ac:spMkLst>
+            <pc:docMk/>
+            <pc:sldMk cId="1109460163" sldId="265"/>
+            <ac:spMk id="3" creationId="{751F0381-076C-B397-3CEC-EDC6A136D7C0}"/>
+          </ac:spMkLst>
+        </pc:spChg>
+        <pc:spChg chg="add">
+          <ac:chgData name="Vera Lissa" userId="b5a833c348c5d4cd" providerId="LiveId" clId="{2FCEFF15-414C-45B8-8E2B-EA31F7FDEAE7}" dt="2023-01-17T18:47:15.983" v="370" actId="26606"/>
+          <ac:spMkLst>
+            <pc:docMk/>
+            <pc:sldMk cId="1109460163" sldId="265"/>
+            <ac:spMk id="8" creationId="{01109B5D-BC35-4376-98A2-F53B03E4E1B4}"/>
+          </ac:spMkLst>
+        </pc:spChg>
+        <pc:spChg chg="add">
+          <ac:chgData name="Vera Lissa" userId="b5a833c348c5d4cd" providerId="LiveId" clId="{2FCEFF15-414C-45B8-8E2B-EA31F7FDEAE7}" dt="2023-01-17T18:47:15.983" v="370" actId="26606"/>
+          <ac:spMkLst>
+            <pc:docMk/>
+            <pc:sldMk cId="1109460163" sldId="265"/>
+            <ac:spMk id="10" creationId="{94D90C11-98A3-40E3-B04C-A3025D6458A3}"/>
+          </ac:spMkLst>
+        </pc:spChg>
+        <pc:spChg chg="add">
+          <ac:chgData name="Vera Lissa" userId="b5a833c348c5d4cd" providerId="LiveId" clId="{2FCEFF15-414C-45B8-8E2B-EA31F7FDEAE7}" dt="2023-01-17T18:47:15.983" v="370" actId="26606"/>
+          <ac:spMkLst>
+            <pc:docMk/>
+            <pc:sldMk cId="1109460163" sldId="265"/>
+            <ac:spMk id="12" creationId="{A3B28FB1-97C9-4A9E-A45B-356508C2C38B}"/>
+          </ac:spMkLst>
+        </pc:spChg>
+      </pc:sldChg>
+    </pc:docChg>
+  </pc:docChgLst>
+</pc:chgInfo>
 </file>
 
 <file path=ppt/slideLayouts/slideLayout1.xml><?xml version="1.0" encoding="utf-8"?>
@@ -13521,6 +13952,612 @@
 </p:sld>
 </file>
 
+<file path=ppt/slides/slide10.xml><?xml version="1.0" encoding="utf-8"?>
+<p:sld xmlns:a="http://schemas.openxmlformats.org/drawingml/2006/main" xmlns:r="http://schemas.openxmlformats.org/officeDocument/2006/relationships" xmlns:p="http://schemas.openxmlformats.org/presentationml/2006/main">
+  <p:cSld>
+    <p:bg>
+      <p:bgPr>
+        <a:solidFill>
+          <a:schemeClr val="bg1"/>
+        </a:solidFill>
+        <a:effectLst/>
+      </p:bgPr>
+    </p:bg>
+    <p:spTree>
+      <p:nvGrpSpPr>
+        <p:cNvPr id="1" name=""/>
+        <p:cNvGrpSpPr/>
+        <p:nvPr/>
+      </p:nvGrpSpPr>
+      <p:grpSpPr>
+        <a:xfrm>
+          <a:off x="0" y="0"/>
+          <a:ext cx="0" cy="0"/>
+          <a:chOff x="0" y="0"/>
+          <a:chExt cx="0" cy="0"/>
+        </a:xfrm>
+      </p:grpSpPr>
+      <p:sp>
+        <p:nvSpPr>
+          <p:cNvPr id="12" name="Freeform 5">
+            <a:extLst>
+              <a:ext uri="{FF2B5EF4-FFF2-40B4-BE49-F238E27FC236}">
+                <a16:creationId xmlns:a16="http://schemas.microsoft.com/office/drawing/2014/main" id="{11CAC6F2-0806-417B-BF5D-5AEF6195FA49}"/>
+              </a:ext>
+              <a:ext uri="{C183D7F6-B498-43B3-948B-1728B52AA6E4}">
+                <adec:decorative xmlns:adec="http://schemas.microsoft.com/office/drawing/2017/decorative" val="1"/>
+              </a:ext>
+            </a:extLst>
+          </p:cNvPr>
+          <p:cNvSpPr>
+            <a:spLocks noGrp="1" noRot="1" noChangeAspect="1" noMove="1" noResize="1" noEditPoints="1" noAdjustHandles="1" noChangeArrowheads="1" noChangeShapeType="1" noTextEdit="1"/>
+          </p:cNvSpPr>
+          <p:nvPr>
+            <p:extLst>
+              <p:ext uri="{386F3935-93C4-4BCD-93E2-E3B085C9AB24}">
+                <p16:designElem xmlns:p16="http://schemas.microsoft.com/office/powerpoint/2015/main" val="1"/>
+              </p:ext>
+            </p:extLst>
+          </p:nvPr>
+        </p:nvSpPr>
+        <p:spPr bwMode="gray">
+          <a:xfrm>
+            <a:off x="0" y="1587"/>
+            <a:ext cx="12192000" cy="6856413"/>
+          </a:xfrm>
+          <a:custGeom>
+            <a:avLst/>
+            <a:gdLst/>
+            <a:ahLst/>
+            <a:cxnLst/>
+            <a:rect l="0" t="0" r="r" b="b"/>
+            <a:pathLst>
+              <a:path w="15356" h="8638">
+                <a:moveTo>
+                  <a:pt x="0" y="0"/>
+                </a:moveTo>
+                <a:lnTo>
+                  <a:pt x="0" y="8638"/>
+                </a:lnTo>
+                <a:lnTo>
+                  <a:pt x="15356" y="8638"/>
+                </a:lnTo>
+                <a:lnTo>
+                  <a:pt x="15356" y="0"/>
+                </a:lnTo>
+                <a:lnTo>
+                  <a:pt x="0" y="0"/>
+                </a:lnTo>
+                <a:close/>
+                <a:moveTo>
+                  <a:pt x="14748" y="8038"/>
+                </a:moveTo>
+                <a:lnTo>
+                  <a:pt x="600" y="8038"/>
+                </a:lnTo>
+                <a:lnTo>
+                  <a:pt x="600" y="592"/>
+                </a:lnTo>
+                <a:lnTo>
+                  <a:pt x="14748" y="592"/>
+                </a:lnTo>
+                <a:lnTo>
+                  <a:pt x="14748" y="8038"/>
+                </a:lnTo>
+                <a:close/>
+              </a:path>
+            </a:pathLst>
+          </a:custGeom>
+          <a:solidFill>
+            <a:schemeClr val="tx1"/>
+          </a:solidFill>
+          <a:ln>
+            <a:noFill/>
+          </a:ln>
+        </p:spPr>
+      </p:sp>
+      <p:sp>
+        <p:nvSpPr>
+          <p:cNvPr id="14" name="Rectangle 13">
+            <a:extLst>
+              <a:ext uri="{FF2B5EF4-FFF2-40B4-BE49-F238E27FC236}">
+                <a16:creationId xmlns:a16="http://schemas.microsoft.com/office/drawing/2014/main" id="{D4723B02-0AAB-4F6E-BA41-8ED99D559D93}"/>
+              </a:ext>
+              <a:ext uri="{C183D7F6-B498-43B3-948B-1728B52AA6E4}">
+                <adec:decorative xmlns:adec="http://schemas.microsoft.com/office/drawing/2017/decorative" val="1"/>
+              </a:ext>
+            </a:extLst>
+          </p:cNvPr>
+          <p:cNvSpPr>
+            <a:spLocks noGrp="1" noRot="1" noChangeAspect="1" noMove="1" noResize="1" noEditPoints="1" noAdjustHandles="1" noChangeArrowheads="1" noChangeShapeType="1" noTextEdit="1"/>
+          </p:cNvSpPr>
+          <p:nvPr>
+            <p:extLst>
+              <p:ext uri="{386F3935-93C4-4BCD-93E2-E3B085C9AB24}">
+                <p16:designElem xmlns:p16="http://schemas.microsoft.com/office/powerpoint/2015/main" val="1"/>
+              </p:ext>
+            </p:extLst>
+          </p:nvPr>
+        </p:nvSpPr>
+        <p:spPr>
+          <a:xfrm>
+            <a:off x="10437812" y="0"/>
+            <a:ext cx="685800" cy="1143000"/>
+          </a:xfrm>
+          <a:prstGeom prst="rect">
+            <a:avLst/>
+          </a:prstGeom>
+          <a:solidFill>
+            <a:schemeClr val="accent1"/>
+          </a:solidFill>
+          <a:ln>
+            <a:noFill/>
+          </a:ln>
+        </p:spPr>
+        <p:style>
+          <a:lnRef idx="1">
+            <a:schemeClr val="accent1"/>
+          </a:lnRef>
+          <a:fillRef idx="3">
+            <a:schemeClr val="accent1"/>
+          </a:fillRef>
+          <a:effectRef idx="2">
+            <a:schemeClr val="accent1"/>
+          </a:effectRef>
+          <a:fontRef idx="minor">
+            <a:schemeClr val="lt1"/>
+          </a:fontRef>
+        </p:style>
+      </p:sp>
+      <p:sp>
+        <p:nvSpPr>
+          <p:cNvPr id="2" name="Title 1">
+            <a:extLst>
+              <a:ext uri="{FF2B5EF4-FFF2-40B4-BE49-F238E27FC236}">
+                <a16:creationId xmlns:a16="http://schemas.microsoft.com/office/drawing/2014/main" id="{644B974F-6A6D-94C8-8EC3-2F94CAAEE3A9}"/>
+              </a:ext>
+            </a:extLst>
+          </p:cNvPr>
+          <p:cNvSpPr>
+            <a:spLocks noGrp="1"/>
+          </p:cNvSpPr>
+          <p:nvPr>
+            <p:ph type="ctrTitle"/>
+          </p:nvPr>
+        </p:nvSpPr>
+        <p:spPr>
+          <a:xfrm>
+            <a:off x="530613" y="450863"/>
+            <a:ext cx="3382297" cy="1150156"/>
+          </a:xfrm>
+        </p:spPr>
+        <p:txBody>
+          <a:bodyPr>
+            <a:normAutofit fontScale="90000"/>
+          </a:bodyPr>
+          <a:lstStyle/>
+          <a:p>
+            <a:r>
+              <a:rPr lang="ru-RU" sz="3800" b="1" dirty="0">
+                <a:solidFill>
+                  <a:srgbClr val="EBEBEB"/>
+                </a:solidFill>
+              </a:rPr>
+              <a:t>Спи</a:t>
+            </a:r>
+            <a:r>
+              <a:rPr lang="en-US" sz="3800" b="1" dirty="0">
+                <a:solidFill>
+                  <a:srgbClr val="EBEBEB"/>
+                </a:solidFill>
+              </a:rPr>
+              <a:t>c</a:t>
+            </a:r>
+            <a:r>
+              <a:rPr lang="ru-RU" sz="3800" b="1" dirty="0">
+                <a:solidFill>
+                  <a:srgbClr val="EBEBEB"/>
+                </a:solidFill>
+              </a:rPr>
+              <a:t>ок литературы</a:t>
+            </a:r>
+            <a:endParaRPr lang="en-SG" sz="3800" b="1" dirty="0">
+              <a:solidFill>
+                <a:srgbClr val="EBEBEB"/>
+              </a:solidFill>
+            </a:endParaRPr>
+          </a:p>
+        </p:txBody>
+      </p:sp>
+      <p:sp>
+        <p:nvSpPr>
+          <p:cNvPr id="3" name="Subtitle 2">
+            <a:extLst>
+              <a:ext uri="{FF2B5EF4-FFF2-40B4-BE49-F238E27FC236}">
+                <a16:creationId xmlns:a16="http://schemas.microsoft.com/office/drawing/2014/main" id="{E72F66A1-978A-8931-BCF3-22798D2285CF}"/>
+              </a:ext>
+            </a:extLst>
+          </p:cNvPr>
+          <p:cNvSpPr>
+            <a:spLocks noGrp="1"/>
+          </p:cNvSpPr>
+          <p:nvPr>
+            <p:ph type="subTitle" idx="1"/>
+          </p:nvPr>
+        </p:nvSpPr>
+        <p:spPr>
+          <a:xfrm>
+            <a:off x="5051766" y="818422"/>
+            <a:ext cx="6235993" cy="5429977"/>
+          </a:xfrm>
+        </p:spPr>
+        <p:txBody>
+          <a:bodyPr>
+            <a:normAutofit/>
+          </a:bodyPr>
+          <a:lstStyle/>
+          <a:p>
+            <a:pPr>
+              <a:lnSpc>
+                <a:spcPct val="90000"/>
+              </a:lnSpc>
+            </a:pPr>
+            <a:r>
+              <a:rPr lang="ru-RU" sz="2400" cap="none" baseline="-25000" dirty="0"/>
+              <a:t>Картинки</a:t>
+            </a:r>
+            <a:r>
+              <a:rPr lang="ru-RU" sz="1600" cap="none" baseline="-25000" dirty="0"/>
+              <a:t>:</a:t>
+            </a:r>
+          </a:p>
+          <a:p>
+            <a:pPr>
+              <a:lnSpc>
+                <a:spcPct val="90000"/>
+              </a:lnSpc>
+            </a:pPr>
+            <a:r>
+              <a:rPr lang="en-SG" sz="2000" cap="none" baseline="-25000" dirty="0">
+                <a:hlinkClick r:id="rId2"/>
+              </a:rPr>
+              <a:t>https://www.irs-software.com/wp-content/uploads/2016/10/store-icon.png</a:t>
+            </a:r>
+            <a:endParaRPr lang="ru-RU" sz="2000" cap="none" baseline="-25000" dirty="0"/>
+          </a:p>
+          <a:p>
+            <a:pPr>
+              <a:lnSpc>
+                <a:spcPct val="90000"/>
+              </a:lnSpc>
+            </a:pPr>
+            <a:r>
+              <a:rPr lang="en-SG" sz="2000" cap="none" baseline="-25000" dirty="0">
+                <a:hlinkClick r:id="rId3"/>
+              </a:rPr>
+              <a:t>https://media.istockphoto.com/photos/blue-wallpaper-background-picture-id186563701?k=6&amp;m=186563701&amp;s=612x612&amp;w=0&amp;h=GWCXrsxo8HD4VFeC865met5GqbkWgjKZmnHFSD9YnXM=</a:t>
+            </a:r>
+            <a:endParaRPr lang="ru-RU" sz="2000" cap="none" baseline="-25000" dirty="0"/>
+          </a:p>
+          <a:p>
+            <a:pPr>
+              <a:lnSpc>
+                <a:spcPct val="90000"/>
+              </a:lnSpc>
+            </a:pPr>
+            <a:r>
+              <a:rPr lang="en-SG" sz="2000" cap="none" baseline="-25000" dirty="0">
+                <a:hlinkClick r:id="rId4"/>
+              </a:rPr>
+              <a:t>https://pngimg.com/uploads/dragon/dragon_PNG84497.png</a:t>
+            </a:r>
+            <a:endParaRPr lang="ru-RU" sz="2000" cap="none" baseline="-25000" dirty="0"/>
+          </a:p>
+          <a:p>
+            <a:pPr>
+              <a:lnSpc>
+                <a:spcPct val="90000"/>
+              </a:lnSpc>
+            </a:pPr>
+            <a:r>
+              <a:rPr lang="en-SG" sz="2000" cap="none" baseline="-25000" dirty="0">
+                <a:hlinkClick r:id="rId5"/>
+              </a:rPr>
+              <a:t>https://cdn.coinskid.com/images/icons/2280.png</a:t>
+            </a:r>
+            <a:endParaRPr lang="ru-RU" sz="2000" cap="none" baseline="-25000" dirty="0"/>
+          </a:p>
+          <a:p>
+            <a:pPr>
+              <a:lnSpc>
+                <a:spcPct val="90000"/>
+              </a:lnSpc>
+            </a:pPr>
+            <a:r>
+              <a:rPr lang="en-SG" sz="2000" cap="none" baseline="-25000" dirty="0">
+                <a:hlinkClick r:id="rId6"/>
+              </a:rPr>
+              <a:t>https://cdn.freebiesupply.com/logos/large/2x/dayton-dragons-logo-png-transparent.png</a:t>
+            </a:r>
+            <a:endParaRPr lang="ru-RU" sz="2000" cap="none" baseline="-25000" dirty="0"/>
+          </a:p>
+          <a:p>
+            <a:pPr>
+              <a:lnSpc>
+                <a:spcPct val="90000"/>
+              </a:lnSpc>
+            </a:pPr>
+            <a:r>
+              <a:rPr lang="en-SG" sz="2000" cap="none" baseline="-25000" dirty="0">
+                <a:hlinkClick r:id="rId7"/>
+              </a:rPr>
+              <a:t>https://tse1.mm.bing.net/th?id=OIP.L_-QGwkBDhCvHVZ0ptzkyQHaHa&amp;pid=Api&amp;P=0</a:t>
+            </a:r>
+            <a:endParaRPr lang="ru-RU" sz="2000" cap="none" baseline="-25000" dirty="0"/>
+          </a:p>
+          <a:p>
+            <a:pPr>
+              <a:lnSpc>
+                <a:spcPct val="90000"/>
+              </a:lnSpc>
+            </a:pPr>
+            <a:r>
+              <a:rPr lang="en-SG" sz="2000" cap="none" baseline="-25000" dirty="0">
+                <a:hlinkClick r:id="rId8"/>
+              </a:rPr>
+              <a:t>http://www.clker.com/cliparts/H/B/t/x/C/5/select-level-md.png</a:t>
+            </a:r>
+            <a:endParaRPr lang="ru-RU" sz="2000" cap="none" baseline="-25000" dirty="0"/>
+          </a:p>
+          <a:p>
+            <a:pPr>
+              <a:lnSpc>
+                <a:spcPct val="90000"/>
+              </a:lnSpc>
+            </a:pPr>
+            <a:r>
+              <a:rPr lang="en-SG" sz="2000" cap="none" baseline="-25000" dirty="0">
+                <a:hlinkClick r:id="rId9"/>
+              </a:rPr>
+              <a:t>https://opengameart.org/sites/default/files/PlayButtonHighlight.png</a:t>
+            </a:r>
+            <a:endParaRPr lang="ru-RU" sz="2000" cap="none" baseline="-25000" dirty="0"/>
+          </a:p>
+          <a:p>
+            <a:pPr>
+              <a:lnSpc>
+                <a:spcPct val="90000"/>
+              </a:lnSpc>
+            </a:pPr>
+            <a:r>
+              <a:rPr lang="en-SG" sz="2000" cap="none" baseline="-25000" dirty="0">
+                <a:hlinkClick r:id="rId10"/>
+              </a:rPr>
+              <a:t>https://emojis.wiki/emoji-pics/apple/blue-square-apple.png</a:t>
+            </a:r>
+            <a:endParaRPr lang="ru-RU" sz="2000" cap="none" baseline="-25000" dirty="0"/>
+          </a:p>
+          <a:p>
+            <a:pPr>
+              <a:lnSpc>
+                <a:spcPct val="90000"/>
+              </a:lnSpc>
+            </a:pPr>
+            <a:r>
+              <a:rPr lang="en-SG" sz="2000" cap="none" baseline="-25000" dirty="0">
+                <a:hlinkClick r:id="rId11"/>
+              </a:rPr>
+              <a:t>https://cdn-icons-png.flaticon.com/512/2077/2077008.png</a:t>
+            </a:r>
+            <a:endParaRPr lang="en-SG" sz="2000" cap="none" baseline="-25000" dirty="0"/>
+          </a:p>
+          <a:p>
+            <a:pPr>
+              <a:lnSpc>
+                <a:spcPct val="90000"/>
+              </a:lnSpc>
+            </a:pPr>
+            <a:r>
+              <a:rPr lang="en-SG" sz="2000" cap="none" baseline="-25000" dirty="0">
+                <a:hlinkClick r:id="rId12"/>
+              </a:rPr>
+              <a:t>https://icon-library.com/images/garden-icon-png/garden-icon-png-6.jpg</a:t>
+            </a:r>
+            <a:endParaRPr lang="en-SG" sz="2000" cap="none" baseline="-25000" dirty="0"/>
+          </a:p>
+          <a:p>
+            <a:pPr>
+              <a:lnSpc>
+                <a:spcPct val="90000"/>
+              </a:lnSpc>
+            </a:pPr>
+            <a:r>
+              <a:rPr lang="en-SG" sz="2000" cap="none" baseline="-25000" dirty="0">
+                <a:hlinkClick r:id="rId13"/>
+              </a:rPr>
+              <a:t>https://cdn-icons-png.flaticon.com/512/191/191038.png</a:t>
+            </a:r>
+            <a:endParaRPr lang="en-SG" sz="2000" cap="none" baseline="-25000" dirty="0"/>
+          </a:p>
+          <a:p>
+            <a:pPr>
+              <a:lnSpc>
+                <a:spcPct val="90000"/>
+              </a:lnSpc>
+            </a:pPr>
+            <a:endParaRPr lang="ru-RU" sz="500" cap="none" baseline="-25000" dirty="0"/>
+          </a:p>
+          <a:p>
+            <a:pPr>
+              <a:lnSpc>
+                <a:spcPct val="90000"/>
+              </a:lnSpc>
+            </a:pPr>
+            <a:endParaRPr lang="ru-RU" sz="500" cap="none" baseline="-25000" dirty="0"/>
+          </a:p>
+          <a:p>
+            <a:pPr>
+              <a:lnSpc>
+                <a:spcPct val="90000"/>
+              </a:lnSpc>
+            </a:pPr>
+            <a:endParaRPr lang="en-SG" sz="500" cap="none" baseline="-25000" dirty="0"/>
+          </a:p>
+        </p:txBody>
+      </p:sp>
+      <p:pic>
+        <p:nvPicPr>
+          <p:cNvPr id="7" name="Graphic 6" descr="Dragon Dance">
+            <a:extLst>
+              <a:ext uri="{FF2B5EF4-FFF2-40B4-BE49-F238E27FC236}">
+                <a16:creationId xmlns:a16="http://schemas.microsoft.com/office/drawing/2014/main" id="{6A7E88BD-043A-C774-51B1-6084C1856E06}"/>
+              </a:ext>
+            </a:extLst>
+          </p:cNvPr>
+          <p:cNvPicPr>
+            <a:picLocks noChangeAspect="1"/>
+          </p:cNvPicPr>
+          <p:nvPr/>
+        </p:nvPicPr>
+        <p:blipFill>
+          <a:blip r:embed="rId14">
+            <a:extLst>
+              <a:ext uri="{28A0092B-C50C-407E-A947-70E740481C1C}">
+                <a14:useLocalDpi xmlns:a14="http://schemas.microsoft.com/office/drawing/2010/main" val="0"/>
+              </a:ext>
+              <a:ext uri="{96DAC541-7B7A-43D3-8B79-37D633B846F1}">
+                <asvg:svgBlip xmlns:asvg="http://schemas.microsoft.com/office/drawing/2016/SVG/main" r:embed="rId15"/>
+              </a:ext>
+            </a:extLst>
+          </a:blip>
+          <a:stretch>
+            <a:fillRect/>
+          </a:stretch>
+        </p:blipFill>
+        <p:spPr>
+          <a:xfrm>
+            <a:off x="904241" y="1601019"/>
+            <a:ext cx="3773897" cy="3773897"/>
+          </a:xfrm>
+          <a:prstGeom prst="roundRect">
+            <a:avLst>
+              <a:gd name="adj" fmla="val 1858"/>
+            </a:avLst>
+          </a:prstGeom>
+          <a:effectLst>
+            <a:outerShdw blurRad="50800" dist="50800" dir="5400000" algn="tl" rotWithShape="0">
+              <a:srgbClr val="000000">
+                <a:alpha val="43000"/>
+              </a:srgbClr>
+            </a:outerShdw>
+          </a:effectLst>
+        </p:spPr>
+      </p:pic>
+    </p:spTree>
+    <p:extLst>
+      <p:ext uri="{BB962C8B-B14F-4D97-AF65-F5344CB8AC3E}">
+        <p14:creationId xmlns:p14="http://schemas.microsoft.com/office/powerpoint/2010/main" val="2347019164"/>
+      </p:ext>
+    </p:extLst>
+  </p:cSld>
+  <p:clrMapOvr>
+    <a:overrideClrMapping bg1="dk1" tx1="lt1" bg2="dk2" tx2="lt2" accent1="accent1" accent2="accent2" accent3="accent3" accent4="accent4" accent5="accent5" accent6="accent6" hlink="hlink" folHlink="folHlink"/>
+  </p:clrMapOvr>
+  <p:timing>
+    <p:tnLst>
+      <p:par>
+        <p:cTn id="1" dur="indefinite" restart="never" nodeType="tmRoot">
+          <p:childTnLst>
+            <p:seq concurrent="1" nextAc="seek">
+              <p:cTn id="2" dur="indefinite" nodeType="mainSeq">
+                <p:childTnLst>
+                  <p:par>
+                    <p:cTn id="3" fill="hold">
+                      <p:stCondLst>
+                        <p:cond delay="indefinite"/>
+                        <p:cond evt="onBegin" delay="0">
+                          <p:tn val="2"/>
+                        </p:cond>
+                      </p:stCondLst>
+                      <p:childTnLst>
+                        <p:par>
+                          <p:cTn id="4" fill="hold">
+                            <p:stCondLst>
+                              <p:cond delay="0"/>
+                            </p:stCondLst>
+                            <p:childTnLst>
+                              <p:par>
+                                <p:cTn id="5" presetID="10" presetClass="entr" presetSubtype="0" fill="hold" grpId="0" nodeType="withEffect">
+                                  <p:stCondLst>
+                                    <p:cond delay="1000"/>
+                                  </p:stCondLst>
+                                  <p:iterate type="lt">
+                                    <p:tmPct val="10000"/>
+                                  </p:iterate>
+                                  <p:childTnLst>
+                                    <p:set>
+                                      <p:cBhvr>
+                                        <p:cTn id="6" dur="1" fill="hold">
+                                          <p:stCondLst>
+                                            <p:cond delay="0"/>
+                                          </p:stCondLst>
+                                        </p:cTn>
+                                        <p:tgtEl>
+                                          <p:spTgt spid="2"/>
+                                        </p:tgtEl>
+                                        <p:attrNameLst>
+                                          <p:attrName>style.visibility</p:attrName>
+                                        </p:attrNameLst>
+                                      </p:cBhvr>
+                                      <p:to>
+                                        <p:strVal val="visible"/>
+                                      </p:to>
+                                    </p:set>
+                                    <p:animEffect transition="in" filter="fade">
+                                      <p:cBhvr>
+                                        <p:cTn id="7" dur="400"/>
+                                        <p:tgtEl>
+                                          <p:spTgt spid="2"/>
+                                        </p:tgtEl>
+                                      </p:cBhvr>
+                                    </p:animEffect>
+                                  </p:childTnLst>
+                                </p:cTn>
+                              </p:par>
+                            </p:childTnLst>
+                          </p:cTn>
+                        </p:par>
+                      </p:childTnLst>
+                    </p:cTn>
+                  </p:par>
+                </p:childTnLst>
+              </p:cTn>
+              <p:prevCondLst>
+                <p:cond evt="onPrev" delay="0">
+                  <p:tgtEl>
+                    <p:sldTgt/>
+                  </p:tgtEl>
+                </p:cond>
+              </p:prevCondLst>
+              <p:nextCondLst>
+                <p:cond evt="onNext" delay="0">
+                  <p:tgtEl>
+                    <p:sldTgt/>
+                  </p:tgtEl>
+                </p:cond>
+              </p:nextCondLst>
+            </p:seq>
+          </p:childTnLst>
+        </p:cTn>
+      </p:par>
+    </p:tnLst>
+    <p:bldLst>
+      <p:bldP spid="2" grpId="0"/>
+    </p:bldLst>
+  </p:timing>
+</p:sld>
+</file>
+
 <file path=ppt/slides/slide2.xml><?xml version="1.0" encoding="utf-8"?>
 <p:sld xmlns:a="http://schemas.openxmlformats.org/drawingml/2006/main" xmlns:r="http://schemas.openxmlformats.org/officeDocument/2006/relationships" xmlns:p="http://schemas.openxmlformats.org/presentationml/2006/main">
   <p:cSld>
@@ -13823,7 +14860,7 @@
         </p:nvSpPr>
         <p:spPr>
           <a:xfrm>
-            <a:off x="3084945" y="489526"/>
+            <a:off x="3084945" y="919379"/>
             <a:ext cx="8571346" cy="6160656"/>
           </a:xfrm>
         </p:spPr>
@@ -13992,7 +15029,7 @@
                   <a:schemeClr val="tx1"/>
                 </a:solidFill>
               </a:rPr>
-              <a:t>|air_dragon.jpg</a:t>
+              <a:t>|air_dragon.png</a:t>
             </a:r>
           </a:p>
           <a:p>
@@ -14028,7 +15065,7 @@
                   <a:schemeClr val="tx1"/>
                 </a:solidFill>
               </a:rPr>
-              <a:t>jpg</a:t>
+              <a:t>png</a:t>
             </a:r>
           </a:p>
           <a:p>
@@ -14038,7 +15075,7 @@
                   <a:schemeClr val="tx1"/>
                 </a:solidFill>
               </a:rPr>
-              <a:t> | fire_dragon.jpg</a:t>
+              <a:t> | fire_dragon.png</a:t>
             </a:r>
           </a:p>
           <a:p>
@@ -14048,7 +15085,7 @@
                   <a:schemeClr val="tx1"/>
                 </a:solidFill>
               </a:rPr>
-              <a:t> |water_dragon.jpg</a:t>
+              <a:t> |water_dragon.png</a:t>
             </a:r>
           </a:p>
         </p:txBody>
@@ -14825,9 +15862,24 @@
   <p:cSld>
     <p:bg>
       <p:bgPr>
-        <a:solidFill>
-          <a:schemeClr val="bg1"/>
-        </a:solidFill>
+        <a:blipFill rotWithShape="1">
+          <a:blip r:embed="rId2">
+            <a:duotone>
+              <a:schemeClr val="bg2">
+                <a:shade val="69000"/>
+                <a:hueMod val="91000"/>
+                <a:satMod val="164000"/>
+                <a:lumMod val="74000"/>
+              </a:schemeClr>
+              <a:schemeClr val="bg2">
+                <a:hueMod val="124000"/>
+                <a:satMod val="140000"/>
+                <a:lumMod val="142000"/>
+              </a:schemeClr>
+            </a:duotone>
+          </a:blip>
+          <a:stretch/>
+        </a:blipFill>
         <a:effectLst/>
       </p:bgPr>
     </p:bg>
@@ -14845,12 +15897,64 @@
           <a:chExt cx="0" cy="0"/>
         </a:xfrm>
       </p:grpSpPr>
+      <p:sp useBgFill="1">
+        <p:nvSpPr>
+          <p:cNvPr id="8" name="Rectangle 7">
+            <a:extLst>
+              <a:ext uri="{FF2B5EF4-FFF2-40B4-BE49-F238E27FC236}">
+                <a16:creationId xmlns:a16="http://schemas.microsoft.com/office/drawing/2014/main" id="{01109B5D-BC35-4376-98A2-F53B03E4E1B4}"/>
+              </a:ext>
+              <a:ext uri="{C183D7F6-B498-43B3-948B-1728B52AA6E4}">
+                <adec:decorative xmlns:adec="http://schemas.microsoft.com/office/drawing/2017/decorative" val="1"/>
+              </a:ext>
+            </a:extLst>
+          </p:cNvPr>
+          <p:cNvSpPr>
+            <a:spLocks noGrp="1" noRot="1" noChangeAspect="1" noMove="1" noResize="1" noEditPoints="1" noAdjustHandles="1" noChangeArrowheads="1" noChangeShapeType="1" noTextEdit="1"/>
+          </p:cNvSpPr>
+          <p:nvPr>
+            <p:extLst>
+              <p:ext uri="{386F3935-93C4-4BCD-93E2-E3B085C9AB24}">
+                <p16:designElem xmlns:p16="http://schemas.microsoft.com/office/powerpoint/2015/main" val="1"/>
+              </p:ext>
+            </p:extLst>
+          </p:nvPr>
+        </p:nvSpPr>
+        <p:spPr>
+          <a:xfrm>
+            <a:off x="0" y="0"/>
+            <a:ext cx="12192000" cy="6858000"/>
+          </a:xfrm>
+          <a:prstGeom prst="rect">
+            <a:avLst/>
+          </a:prstGeom>
+          <a:ln>
+            <a:noFill/>
+          </a:ln>
+        </p:spPr>
+        <p:style>
+          <a:lnRef idx="2">
+            <a:schemeClr val="accent1">
+              <a:shade val="50000"/>
+            </a:schemeClr>
+          </a:lnRef>
+          <a:fillRef idx="1">
+            <a:schemeClr val="accent1"/>
+          </a:fillRef>
+          <a:effectRef idx="0">
+            <a:schemeClr val="accent1"/>
+          </a:effectRef>
+          <a:fontRef idx="minor">
+            <a:schemeClr val="lt1"/>
+          </a:fontRef>
+        </p:style>
+      </p:sp>
       <p:sp>
         <p:nvSpPr>
-          <p:cNvPr id="12" name="Freeform 5">
+          <p:cNvPr id="10" name="Freeform 5">
             <a:extLst>
               <a:ext uri="{FF2B5EF4-FFF2-40B4-BE49-F238E27FC236}">
-                <a16:creationId xmlns:a16="http://schemas.microsoft.com/office/drawing/2014/main" id="{11CAC6F2-0806-417B-BF5D-5AEF6195FA49}"/>
+                <a16:creationId xmlns:a16="http://schemas.microsoft.com/office/drawing/2014/main" id="{94D90C11-98A3-40E3-B04C-A3025D6458A3}"/>
               </a:ext>
               <a:ext uri="{C183D7F6-B498-43B3-948B-1728B52AA6E4}">
                 <adec:decorative xmlns:adec="http://schemas.microsoft.com/office/drawing/2017/decorative" val="1"/>
@@ -14870,7 +15974,7 @@
         </p:nvSpPr>
         <p:spPr bwMode="gray">
           <a:xfrm>
-            <a:off x="0" y="1587"/>
+            <a:off x="0" y="0"/>
             <a:ext cx="12192000" cy="6856413"/>
           </a:xfrm>
           <a:custGeom>
@@ -14926,10 +16030,49 @@
       </p:sp>
       <p:sp>
         <p:nvSpPr>
-          <p:cNvPr id="14" name="Rectangle 13">
+          <p:cNvPr id="2" name="Title 1">
             <a:extLst>
               <a:ext uri="{FF2B5EF4-FFF2-40B4-BE49-F238E27FC236}">
-                <a16:creationId xmlns:a16="http://schemas.microsoft.com/office/drawing/2014/main" id="{D4723B02-0AAB-4F6E-BA41-8ED99D559D93}"/>
+                <a16:creationId xmlns:a16="http://schemas.microsoft.com/office/drawing/2014/main" id="{B2CE05E5-6DD1-AFA9-60A7-6D6DA3344497}"/>
+              </a:ext>
+            </a:extLst>
+          </p:cNvPr>
+          <p:cNvSpPr>
+            <a:spLocks noGrp="1"/>
+          </p:cNvSpPr>
+          <p:nvPr>
+            <p:ph type="title"/>
+          </p:nvPr>
+        </p:nvSpPr>
+        <p:spPr>
+          <a:xfrm>
+            <a:off x="4686350" y="800862"/>
+            <a:ext cx="3309569" cy="684276"/>
+          </a:xfrm>
+        </p:spPr>
+        <p:txBody>
+          <a:bodyPr anchor="t">
+            <a:noAutofit/>
+          </a:bodyPr>
+          <a:lstStyle/>
+          <a:p>
+            <a:r>
+              <a:rPr lang="en-SG" sz="2800" b="1" dirty="0">
+                <a:solidFill>
+                  <a:schemeClr val="tx1"/>
+                </a:solidFill>
+              </a:rPr>
+              <a:t>Dragonfight.py</a:t>
+            </a:r>
+          </a:p>
+        </p:txBody>
+      </p:sp>
+      <p:sp>
+        <p:nvSpPr>
+          <p:cNvPr id="12" name="Rectangle 11">
+            <a:extLst>
+              <a:ext uri="{FF2B5EF4-FFF2-40B4-BE49-F238E27FC236}">
+                <a16:creationId xmlns:a16="http://schemas.microsoft.com/office/drawing/2014/main" id="{A3B28FB1-97C9-4A9E-A45B-356508C2C38B}"/>
               </a:ext>
               <a:ext uri="{C183D7F6-B498-43B3-948B-1728B52AA6E4}">
                 <adec:decorative xmlns:adec="http://schemas.microsoft.com/office/drawing/2017/decorative" val="1"/>
@@ -14979,10 +16122,10 @@
       </p:sp>
       <p:sp>
         <p:nvSpPr>
-          <p:cNvPr id="2" name="Title 1">
+          <p:cNvPr id="3" name="Content Placeholder 2">
             <a:extLst>
               <a:ext uri="{FF2B5EF4-FFF2-40B4-BE49-F238E27FC236}">
-                <a16:creationId xmlns:a16="http://schemas.microsoft.com/office/drawing/2014/main" id="{644B974F-6A6D-94C8-8EC3-2F94CAAEE3A9}"/>
+                <a16:creationId xmlns:a16="http://schemas.microsoft.com/office/drawing/2014/main" id="{7E7C716A-6B7B-9916-F470-6925D743F243}"/>
               </a:ext>
             </a:extLst>
           </p:cNvPr>
@@ -14990,59 +16133,219 @@
             <a:spLocks noGrp="1"/>
           </p:cNvSpPr>
           <p:nvPr>
-            <p:ph type="ctrTitle"/>
+            <p:ph idx="1"/>
           </p:nvPr>
         </p:nvSpPr>
         <p:spPr>
           <a:xfrm>
-            <a:off x="530613" y="450863"/>
-            <a:ext cx="3382297" cy="1150156"/>
+            <a:off x="2185753" y="1581404"/>
+            <a:ext cx="6230220" cy="4391640"/>
           </a:xfrm>
         </p:spPr>
         <p:txBody>
           <a:bodyPr>
-            <a:normAutofit fontScale="90000"/>
+            <a:normAutofit/>
           </a:bodyPr>
           <a:lstStyle/>
           <a:p>
-            <a:r>
-              <a:rPr lang="ru-RU" sz="3800" b="1" dirty="0">
-                <a:solidFill>
-                  <a:srgbClr val="EBEBEB"/>
-                </a:solidFill>
-              </a:rPr>
-              <a:t>Спи</a:t>
-            </a:r>
-            <a:r>
-              <a:rPr lang="en-US" sz="3800" b="1" dirty="0">
-                <a:solidFill>
-                  <a:srgbClr val="EBEBEB"/>
-                </a:solidFill>
-              </a:rPr>
-              <a:t>c</a:t>
-            </a:r>
-            <a:r>
-              <a:rPr lang="ru-RU" sz="3800" b="1" dirty="0">
-                <a:solidFill>
-                  <a:srgbClr val="EBEBEB"/>
-                </a:solidFill>
-              </a:rPr>
-              <a:t>ок литературы</a:t>
-            </a:r>
-            <a:endParaRPr lang="en-SG" sz="3800" b="1" dirty="0">
+            <a:endParaRPr lang="en-SG" dirty="0">
               <a:solidFill>
-                <a:srgbClr val="EBEBEB"/>
+                <a:schemeClr val="tx1"/>
               </a:solidFill>
             </a:endParaRPr>
           </a:p>
         </p:txBody>
+      </p:sp>
+    </p:spTree>
+    <p:extLst>
+      <p:ext uri="{BB962C8B-B14F-4D97-AF65-F5344CB8AC3E}">
+        <p14:creationId xmlns:p14="http://schemas.microsoft.com/office/powerpoint/2010/main" val="3113367059"/>
+      </p:ext>
+    </p:extLst>
+  </p:cSld>
+  <p:clrMapOvr>
+    <a:overrideClrMapping bg1="dk1" tx1="lt1" bg2="dk2" tx2="lt2" accent1="accent1" accent2="accent2" accent3="accent3" accent4="accent4" accent5="accent5" accent6="accent6" hlink="hlink" folHlink="folHlink"/>
+  </p:clrMapOvr>
+</p:sld>
+</file>
+
+<file path=ppt/slides/slide6.xml><?xml version="1.0" encoding="utf-8"?>
+<p:sld xmlns:a="http://schemas.openxmlformats.org/drawingml/2006/main" xmlns:r="http://schemas.openxmlformats.org/officeDocument/2006/relationships" xmlns:p="http://schemas.openxmlformats.org/presentationml/2006/main">
+  <p:cSld>
+    <p:bg>
+      <p:bgPr>
+        <a:blipFill rotWithShape="1">
+          <a:blip r:embed="rId2">
+            <a:duotone>
+              <a:schemeClr val="bg2">
+                <a:shade val="69000"/>
+                <a:hueMod val="91000"/>
+                <a:satMod val="164000"/>
+                <a:lumMod val="74000"/>
+              </a:schemeClr>
+              <a:schemeClr val="bg2">
+                <a:hueMod val="124000"/>
+                <a:satMod val="140000"/>
+                <a:lumMod val="142000"/>
+              </a:schemeClr>
+            </a:duotone>
+          </a:blip>
+          <a:stretch/>
+        </a:blipFill>
+        <a:effectLst/>
+      </p:bgPr>
+    </p:bg>
+    <p:spTree>
+      <p:nvGrpSpPr>
+        <p:cNvPr id="1" name=""/>
+        <p:cNvGrpSpPr/>
+        <p:nvPr/>
+      </p:nvGrpSpPr>
+      <p:grpSpPr>
+        <a:xfrm>
+          <a:off x="0" y="0"/>
+          <a:ext cx="0" cy="0"/>
+          <a:chOff x="0" y="0"/>
+          <a:chExt cx="0" cy="0"/>
+        </a:xfrm>
+      </p:grpSpPr>
+      <p:sp useBgFill="1">
+        <p:nvSpPr>
+          <p:cNvPr id="8" name="Rectangle 7">
+            <a:extLst>
+              <a:ext uri="{FF2B5EF4-FFF2-40B4-BE49-F238E27FC236}">
+                <a16:creationId xmlns:a16="http://schemas.microsoft.com/office/drawing/2014/main" id="{01109B5D-BC35-4376-98A2-F53B03E4E1B4}"/>
+              </a:ext>
+              <a:ext uri="{C183D7F6-B498-43B3-948B-1728B52AA6E4}">
+                <adec:decorative xmlns:adec="http://schemas.microsoft.com/office/drawing/2017/decorative" val="1"/>
+              </a:ext>
+            </a:extLst>
+          </p:cNvPr>
+          <p:cNvSpPr>
+            <a:spLocks noGrp="1" noRot="1" noChangeAspect="1" noMove="1" noResize="1" noEditPoints="1" noAdjustHandles="1" noChangeArrowheads="1" noChangeShapeType="1" noTextEdit="1"/>
+          </p:cNvSpPr>
+          <p:nvPr>
+            <p:extLst>
+              <p:ext uri="{386F3935-93C4-4BCD-93E2-E3B085C9AB24}">
+                <p16:designElem xmlns:p16="http://schemas.microsoft.com/office/powerpoint/2015/main" val="1"/>
+              </p:ext>
+            </p:extLst>
+          </p:nvPr>
+        </p:nvSpPr>
+        <p:spPr>
+          <a:xfrm>
+            <a:off x="0" y="0"/>
+            <a:ext cx="12192000" cy="6858000"/>
+          </a:xfrm>
+          <a:prstGeom prst="rect">
+            <a:avLst/>
+          </a:prstGeom>
+          <a:ln>
+            <a:noFill/>
+          </a:ln>
+        </p:spPr>
+        <p:style>
+          <a:lnRef idx="2">
+            <a:schemeClr val="accent1">
+              <a:shade val="50000"/>
+            </a:schemeClr>
+          </a:lnRef>
+          <a:fillRef idx="1">
+            <a:schemeClr val="accent1"/>
+          </a:fillRef>
+          <a:effectRef idx="0">
+            <a:schemeClr val="accent1"/>
+          </a:effectRef>
+          <a:fontRef idx="minor">
+            <a:schemeClr val="lt1"/>
+          </a:fontRef>
+        </p:style>
       </p:sp>
       <p:sp>
         <p:nvSpPr>
-          <p:cNvPr id="3" name="Subtitle 2">
+          <p:cNvPr id="10" name="Freeform 5">
             <a:extLst>
               <a:ext uri="{FF2B5EF4-FFF2-40B4-BE49-F238E27FC236}">
-                <a16:creationId xmlns:a16="http://schemas.microsoft.com/office/drawing/2014/main" id="{E72F66A1-978A-8931-BCF3-22798D2285CF}"/>
+                <a16:creationId xmlns:a16="http://schemas.microsoft.com/office/drawing/2014/main" id="{94D90C11-98A3-40E3-B04C-A3025D6458A3}"/>
+              </a:ext>
+              <a:ext uri="{C183D7F6-B498-43B3-948B-1728B52AA6E4}">
+                <adec:decorative xmlns:adec="http://schemas.microsoft.com/office/drawing/2017/decorative" val="1"/>
+              </a:ext>
+            </a:extLst>
+          </p:cNvPr>
+          <p:cNvSpPr>
+            <a:spLocks noGrp="1" noRot="1" noChangeAspect="1" noMove="1" noResize="1" noEditPoints="1" noAdjustHandles="1" noChangeArrowheads="1" noChangeShapeType="1" noTextEdit="1"/>
+          </p:cNvSpPr>
+          <p:nvPr>
+            <p:extLst>
+              <p:ext uri="{386F3935-93C4-4BCD-93E2-E3B085C9AB24}">
+                <p16:designElem xmlns:p16="http://schemas.microsoft.com/office/powerpoint/2015/main" val="1"/>
+              </p:ext>
+            </p:extLst>
+          </p:nvPr>
+        </p:nvSpPr>
+        <p:spPr bwMode="gray">
+          <a:xfrm>
+            <a:off x="0" y="0"/>
+            <a:ext cx="12192000" cy="6856413"/>
+          </a:xfrm>
+          <a:custGeom>
+            <a:avLst/>
+            <a:gdLst/>
+            <a:ahLst/>
+            <a:cxnLst/>
+            <a:rect l="0" t="0" r="r" b="b"/>
+            <a:pathLst>
+              <a:path w="15356" h="8638">
+                <a:moveTo>
+                  <a:pt x="0" y="0"/>
+                </a:moveTo>
+                <a:lnTo>
+                  <a:pt x="0" y="8638"/>
+                </a:lnTo>
+                <a:lnTo>
+                  <a:pt x="15356" y="8638"/>
+                </a:lnTo>
+                <a:lnTo>
+                  <a:pt x="15356" y="0"/>
+                </a:lnTo>
+                <a:lnTo>
+                  <a:pt x="0" y="0"/>
+                </a:lnTo>
+                <a:close/>
+                <a:moveTo>
+                  <a:pt x="14748" y="8038"/>
+                </a:moveTo>
+                <a:lnTo>
+                  <a:pt x="600" y="8038"/>
+                </a:lnTo>
+                <a:lnTo>
+                  <a:pt x="600" y="592"/>
+                </a:lnTo>
+                <a:lnTo>
+                  <a:pt x="14748" y="592"/>
+                </a:lnTo>
+                <a:lnTo>
+                  <a:pt x="14748" y="8038"/>
+                </a:lnTo>
+                <a:close/>
+              </a:path>
+            </a:pathLst>
+          </a:custGeom>
+          <a:solidFill>
+            <a:schemeClr val="tx1"/>
+          </a:solidFill>
+          <a:ln>
+            <a:noFill/>
+          </a:ln>
+        </p:spPr>
+      </p:sp>
+      <p:sp>
+        <p:nvSpPr>
+          <p:cNvPr id="2" name="Title 1">
+            <a:extLst>
+              <a:ext uri="{FF2B5EF4-FFF2-40B4-BE49-F238E27FC236}">
+                <a16:creationId xmlns:a16="http://schemas.microsoft.com/office/drawing/2014/main" id="{F243D50A-80AA-E5D9-F176-E05724765F9D}"/>
               </a:ext>
             </a:extLst>
           </p:cNvPr>
@@ -15050,235 +16353,132 @@
             <a:spLocks noGrp="1"/>
           </p:cNvSpPr>
           <p:nvPr>
-            <p:ph type="subTitle" idx="1"/>
+            <p:ph type="title"/>
           </p:nvPr>
         </p:nvSpPr>
         <p:spPr>
           <a:xfrm>
-            <a:off x="5051766" y="818422"/>
-            <a:ext cx="6235993" cy="5429977"/>
+            <a:off x="2423532" y="830488"/>
+            <a:ext cx="7344936" cy="1155331"/>
           </a:xfrm>
         </p:spPr>
         <p:txBody>
-          <a:bodyPr>
+          <a:bodyPr anchor="t">
             <a:normAutofit/>
           </a:bodyPr>
           <a:lstStyle/>
           <a:p>
-            <a:pPr>
-              <a:lnSpc>
-                <a:spcPct val="90000"/>
-              </a:lnSpc>
-            </a:pPr>
             <a:r>
-              <a:rPr lang="ru-RU" sz="2400" cap="none" baseline="-25000" dirty="0"/>
-              <a:t>Картинки</a:t>
+              <a:rPr lang="ru-RU" sz="2800" b="1" dirty="0">
+                <a:solidFill>
+                  <a:schemeClr val="tx1"/>
+                </a:solidFill>
+                <a:latin typeface="+mn-lt"/>
+              </a:rPr>
+              <a:t>Скриншоты работающей программы</a:t>
             </a:r>
-            <a:r>
-              <a:rPr lang="ru-RU" sz="1600" cap="none" baseline="-25000" dirty="0"/>
-              <a:t>:</a:t>
-            </a:r>
-          </a:p>
-          <a:p>
-            <a:pPr>
-              <a:lnSpc>
-                <a:spcPct val="90000"/>
-              </a:lnSpc>
-            </a:pPr>
-            <a:r>
-              <a:rPr lang="en-SG" sz="2000" cap="none" baseline="-25000" dirty="0">
-                <a:hlinkClick r:id="rId2"/>
-              </a:rPr>
-              <a:t>https://www.irs-software.com/wp-content/uploads/2016/10/store-icon.png</a:t>
-            </a:r>
-            <a:endParaRPr lang="ru-RU" sz="2000" cap="none" baseline="-25000" dirty="0"/>
-          </a:p>
-          <a:p>
-            <a:pPr>
-              <a:lnSpc>
-                <a:spcPct val="90000"/>
-              </a:lnSpc>
-            </a:pPr>
-            <a:r>
-              <a:rPr lang="en-SG" sz="2000" cap="none" baseline="-25000" dirty="0">
-                <a:hlinkClick r:id="rId3"/>
-              </a:rPr>
-              <a:t>https://media.istockphoto.com/photos/blue-wallpaper-background-picture-id186563701?k=6&amp;m=186563701&amp;s=612x612&amp;w=0&amp;h=GWCXrsxo8HD4VFeC865met5GqbkWgjKZmnHFSD9YnXM=</a:t>
-            </a:r>
-            <a:endParaRPr lang="ru-RU" sz="2000" cap="none" baseline="-25000" dirty="0"/>
-          </a:p>
-          <a:p>
-            <a:pPr>
-              <a:lnSpc>
-                <a:spcPct val="90000"/>
-              </a:lnSpc>
-            </a:pPr>
-            <a:r>
-              <a:rPr lang="en-SG" sz="2000" cap="none" baseline="-25000" dirty="0">
-                <a:hlinkClick r:id="rId4"/>
-              </a:rPr>
-              <a:t>https://pngimg.com/uploads/dragon/dragon_PNG84497.png</a:t>
-            </a:r>
-            <a:endParaRPr lang="ru-RU" sz="2000" cap="none" baseline="-25000" dirty="0"/>
-          </a:p>
-          <a:p>
-            <a:pPr>
-              <a:lnSpc>
-                <a:spcPct val="90000"/>
-              </a:lnSpc>
-            </a:pPr>
-            <a:r>
-              <a:rPr lang="en-SG" sz="2000" cap="none" baseline="-25000" dirty="0">
-                <a:hlinkClick r:id="rId5"/>
-              </a:rPr>
-              <a:t>https://cdn.coinskid.com/images/icons/2280.png</a:t>
-            </a:r>
-            <a:endParaRPr lang="ru-RU" sz="2000" cap="none" baseline="-25000" dirty="0"/>
-          </a:p>
-          <a:p>
-            <a:pPr>
-              <a:lnSpc>
-                <a:spcPct val="90000"/>
-              </a:lnSpc>
-            </a:pPr>
-            <a:r>
-              <a:rPr lang="en-SG" sz="2000" cap="none" baseline="-25000" dirty="0">
-                <a:hlinkClick r:id="rId6"/>
-              </a:rPr>
-              <a:t>https://cdn.freebiesupply.com/logos/large/2x/dayton-dragons-logo-png-transparent.png</a:t>
-            </a:r>
-            <a:endParaRPr lang="ru-RU" sz="2000" cap="none" baseline="-25000" dirty="0"/>
-          </a:p>
-          <a:p>
-            <a:pPr>
-              <a:lnSpc>
-                <a:spcPct val="90000"/>
-              </a:lnSpc>
-            </a:pPr>
-            <a:r>
-              <a:rPr lang="en-SG" sz="2000" cap="none" baseline="-25000" dirty="0">
-                <a:hlinkClick r:id="rId7"/>
-              </a:rPr>
-              <a:t>https://tse1.mm.bing.net/th?id=OIP.L_-QGwkBDhCvHVZ0ptzkyQHaHa&amp;pid=Api&amp;P=0</a:t>
-            </a:r>
-            <a:endParaRPr lang="ru-RU" sz="2000" cap="none" baseline="-25000" dirty="0"/>
-          </a:p>
-          <a:p>
-            <a:pPr>
-              <a:lnSpc>
-                <a:spcPct val="90000"/>
-              </a:lnSpc>
-            </a:pPr>
-            <a:r>
-              <a:rPr lang="en-SG" sz="2000" cap="none" baseline="-25000" dirty="0">
-                <a:hlinkClick r:id="rId8"/>
-              </a:rPr>
-              <a:t>http://www.clker.com/cliparts/H/B/t/x/C/5/select-level-md.png</a:t>
-            </a:r>
-            <a:endParaRPr lang="ru-RU" sz="2000" cap="none" baseline="-25000" dirty="0"/>
-          </a:p>
-          <a:p>
-            <a:pPr>
-              <a:lnSpc>
-                <a:spcPct val="90000"/>
-              </a:lnSpc>
-            </a:pPr>
-            <a:r>
-              <a:rPr lang="en-SG" sz="2000" cap="none" baseline="-25000" dirty="0">
-                <a:hlinkClick r:id="rId9"/>
-              </a:rPr>
-              <a:t>https://opengameart.org/sites/default/files/PlayButtonHighlight.png</a:t>
-            </a:r>
-            <a:endParaRPr lang="ru-RU" sz="2000" cap="none" baseline="-25000" dirty="0"/>
-          </a:p>
-          <a:p>
-            <a:pPr>
-              <a:lnSpc>
-                <a:spcPct val="90000"/>
-              </a:lnSpc>
-            </a:pPr>
-            <a:r>
-              <a:rPr lang="en-SG" sz="2000" cap="none" baseline="-25000" dirty="0">
-                <a:hlinkClick r:id="rId10"/>
-              </a:rPr>
-              <a:t>https://emojis.wiki/emoji-pics/apple/blue-square-apple.png</a:t>
-            </a:r>
-            <a:endParaRPr lang="ru-RU" sz="2000" cap="none" baseline="-25000" dirty="0"/>
-          </a:p>
-          <a:p>
-            <a:pPr>
-              <a:lnSpc>
-                <a:spcPct val="90000"/>
-              </a:lnSpc>
-            </a:pPr>
-            <a:r>
-              <a:rPr lang="en-SG" sz="2000" cap="none" baseline="-25000" dirty="0">
-                <a:hlinkClick r:id="rId11"/>
-              </a:rPr>
-              <a:t>https://cdn-icons-png.flaticon.com/512/2077/2077008.png</a:t>
-            </a:r>
-            <a:endParaRPr lang="en-SG" sz="2000" cap="none" baseline="-25000" dirty="0"/>
-          </a:p>
-          <a:p>
-            <a:pPr>
-              <a:lnSpc>
-                <a:spcPct val="90000"/>
-              </a:lnSpc>
-            </a:pPr>
-            <a:r>
-              <a:rPr lang="en-SG" sz="2000" cap="none" baseline="-25000" dirty="0">
-                <a:hlinkClick r:id="rId12"/>
-              </a:rPr>
-              <a:t>https://icon-library.com/images/garden-icon-png/garden-icon-png-6.jpg</a:t>
-            </a:r>
-            <a:endParaRPr lang="en-SG" sz="2000" cap="none" baseline="-25000" dirty="0"/>
-          </a:p>
-          <a:p>
-            <a:pPr>
-              <a:lnSpc>
-                <a:spcPct val="90000"/>
-              </a:lnSpc>
-            </a:pPr>
-            <a:r>
-              <a:rPr lang="en-SG" sz="2000" cap="none" baseline="-25000" dirty="0">
-                <a:hlinkClick r:id="rId13"/>
-              </a:rPr>
-              <a:t>https://cdn-icons-png.flaticon.com/512/191/191038.png</a:t>
-            </a:r>
-            <a:endParaRPr lang="en-SG" sz="2000" cap="none" baseline="-25000" dirty="0"/>
-          </a:p>
-          <a:p>
-            <a:pPr>
-              <a:lnSpc>
-                <a:spcPct val="90000"/>
-              </a:lnSpc>
-            </a:pPr>
-            <a:endParaRPr lang="ru-RU" sz="500" cap="none" baseline="-25000" dirty="0"/>
-          </a:p>
-          <a:p>
-            <a:pPr>
-              <a:lnSpc>
-                <a:spcPct val="90000"/>
-              </a:lnSpc>
-            </a:pPr>
-            <a:endParaRPr lang="ru-RU" sz="500" cap="none" baseline="-25000" dirty="0"/>
-          </a:p>
-          <a:p>
-            <a:pPr>
-              <a:lnSpc>
-                <a:spcPct val="90000"/>
-              </a:lnSpc>
-            </a:pPr>
-            <a:endParaRPr lang="en-SG" sz="500" cap="none" baseline="-25000" dirty="0"/>
+            <a:endParaRPr lang="en-SG" sz="2800" b="1" dirty="0">
+              <a:solidFill>
+                <a:schemeClr val="tx1"/>
+              </a:solidFill>
+            </a:endParaRPr>
           </a:p>
         </p:txBody>
+      </p:sp>
+      <p:sp>
+        <p:nvSpPr>
+          <p:cNvPr id="12" name="Rectangle 11">
+            <a:extLst>
+              <a:ext uri="{FF2B5EF4-FFF2-40B4-BE49-F238E27FC236}">
+                <a16:creationId xmlns:a16="http://schemas.microsoft.com/office/drawing/2014/main" id="{A3B28FB1-97C9-4A9E-A45B-356508C2C38B}"/>
+              </a:ext>
+              <a:ext uri="{C183D7F6-B498-43B3-948B-1728B52AA6E4}">
+                <adec:decorative xmlns:adec="http://schemas.microsoft.com/office/drawing/2017/decorative" val="1"/>
+              </a:ext>
+            </a:extLst>
+          </p:cNvPr>
+          <p:cNvSpPr>
+            <a:spLocks noGrp="1" noRot="1" noChangeAspect="1" noMove="1" noResize="1" noEditPoints="1" noAdjustHandles="1" noChangeArrowheads="1" noChangeShapeType="1" noTextEdit="1"/>
+          </p:cNvSpPr>
+          <p:nvPr>
+            <p:extLst>
+              <p:ext uri="{386F3935-93C4-4BCD-93E2-E3B085C9AB24}">
+                <p16:designElem xmlns:p16="http://schemas.microsoft.com/office/powerpoint/2015/main" val="1"/>
+              </p:ext>
+            </p:extLst>
+          </p:nvPr>
+        </p:nvSpPr>
+        <p:spPr>
+          <a:xfrm>
+            <a:off x="10437812" y="0"/>
+            <a:ext cx="685800" cy="1143000"/>
+          </a:xfrm>
+          <a:prstGeom prst="rect">
+            <a:avLst/>
+          </a:prstGeom>
+          <a:solidFill>
+            <a:schemeClr val="accent1"/>
+          </a:solidFill>
+          <a:ln>
+            <a:noFill/>
+          </a:ln>
+        </p:spPr>
+        <p:style>
+          <a:lnRef idx="1">
+            <a:schemeClr val="accent1"/>
+          </a:lnRef>
+          <a:fillRef idx="3">
+            <a:schemeClr val="accent1"/>
+          </a:fillRef>
+          <a:effectRef idx="2">
+            <a:schemeClr val="accent1"/>
+          </a:effectRef>
+          <a:fontRef idx="minor">
+            <a:schemeClr val="lt1"/>
+          </a:fontRef>
+        </p:style>
       </p:sp>
       <p:pic>
         <p:nvPicPr>
-          <p:cNvPr id="7" name="Graphic 6" descr="Dragon Dance">
+          <p:cNvPr id="5" name="Content Placeholder 4" descr="Graphical user interface, application&#10;&#10;Description automatically generated">
             <a:extLst>
               <a:ext uri="{FF2B5EF4-FFF2-40B4-BE49-F238E27FC236}">
-                <a16:creationId xmlns:a16="http://schemas.microsoft.com/office/drawing/2014/main" id="{6A7E88BD-043A-C774-51B1-6084C1856E06}"/>
+                <a16:creationId xmlns:a16="http://schemas.microsoft.com/office/drawing/2014/main" id="{6484BF81-DE68-A587-9A30-C5F8B3F54B33}"/>
+              </a:ext>
+            </a:extLst>
+          </p:cNvPr>
+          <p:cNvPicPr>
+            <a:picLocks noGrp="1" noChangeAspect="1"/>
+          </p:cNvPicPr>
+          <p:nvPr>
+            <p:ph idx="1"/>
+          </p:nvPr>
+        </p:nvPicPr>
+        <p:blipFill>
+          <a:blip r:embed="rId3">
+            <a:extLst>
+              <a:ext uri="{28A0092B-C50C-407E-A947-70E740481C1C}">
+                <a14:useLocalDpi xmlns:a14="http://schemas.microsoft.com/office/drawing/2010/main" val="0"/>
+              </a:ext>
+            </a:extLst>
+          </a:blip>
+          <a:stretch>
+            <a:fillRect/>
+          </a:stretch>
+        </p:blipFill>
+        <p:spPr>
+          <a:xfrm>
+            <a:off x="610438" y="1431992"/>
+            <a:ext cx="2541169" cy="2092368"/>
+          </a:xfrm>
+        </p:spPr>
+      </p:pic>
+      <p:pic>
+        <p:nvPicPr>
+          <p:cNvPr id="7" name="Picture 6" descr="Graphical user interface&#10;&#10;Description automatically generated with medium confidence">
+            <a:extLst>
+              <a:ext uri="{FF2B5EF4-FFF2-40B4-BE49-F238E27FC236}">
+                <a16:creationId xmlns:a16="http://schemas.microsoft.com/office/drawing/2014/main" id="{7C77D299-2EDD-9C84-47D5-BE127A2797B0}"/>
               </a:ext>
             </a:extLst>
           </p:cNvPr>
@@ -15288,13 +16488,10 @@
           <p:nvPr/>
         </p:nvPicPr>
         <p:blipFill>
-          <a:blip r:embed="rId14">
+          <a:blip r:embed="rId4">
             <a:extLst>
               <a:ext uri="{28A0092B-C50C-407E-A947-70E740481C1C}">
                 <a14:useLocalDpi xmlns:a14="http://schemas.microsoft.com/office/drawing/2010/main" val="0"/>
-              </a:ext>
-              <a:ext uri="{96DAC541-7B7A-43D3-8B79-37D633B846F1}">
-                <asvg:svgBlip xmlns:asvg="http://schemas.microsoft.com/office/drawing/2016/SVG/main" r:embed="rId15"/>
               </a:ext>
             </a:extLst>
           </a:blip>
@@ -15304,125 +16501,1148 @@
         </p:blipFill>
         <p:spPr>
           <a:xfrm>
-            <a:off x="904241" y="1601019"/>
-            <a:ext cx="3773897" cy="3773897"/>
+            <a:off x="3323352" y="1408151"/>
+            <a:ext cx="2570232" cy="2092368"/>
           </a:xfrm>
-          <a:prstGeom prst="roundRect">
-            <a:avLst>
-              <a:gd name="adj" fmla="val 1858"/>
-            </a:avLst>
+          <a:prstGeom prst="rect">
+            <a:avLst/>
           </a:prstGeom>
-          <a:effectLst>
-            <a:outerShdw blurRad="50800" dist="50800" dir="5400000" algn="tl" rotWithShape="0">
-              <a:srgbClr val="000000">
-                <a:alpha val="43000"/>
-              </a:srgbClr>
-            </a:outerShdw>
-          </a:effectLst>
+        </p:spPr>
+      </p:pic>
+      <p:pic>
+        <p:nvPicPr>
+          <p:cNvPr id="11" name="Picture 10" descr="Graphical user interface, text, application&#10;&#10;Description automatically generated">
+            <a:extLst>
+              <a:ext uri="{FF2B5EF4-FFF2-40B4-BE49-F238E27FC236}">
+                <a16:creationId xmlns:a16="http://schemas.microsoft.com/office/drawing/2014/main" id="{35639604-7849-2EC4-669B-D59431E5566B}"/>
+              </a:ext>
+            </a:extLst>
+          </p:cNvPr>
+          <p:cNvPicPr>
+            <a:picLocks noChangeAspect="1"/>
+          </p:cNvPicPr>
+          <p:nvPr/>
+        </p:nvPicPr>
+        <p:blipFill>
+          <a:blip r:embed="rId5">
+            <a:extLst>
+              <a:ext uri="{28A0092B-C50C-407E-A947-70E740481C1C}">
+                <a14:useLocalDpi xmlns:a14="http://schemas.microsoft.com/office/drawing/2010/main" val="0"/>
+              </a:ext>
+            </a:extLst>
+          </a:blip>
+          <a:stretch>
+            <a:fillRect/>
+          </a:stretch>
+        </p:blipFill>
+        <p:spPr>
+          <a:xfrm>
+            <a:off x="6050461" y="1431992"/>
+            <a:ext cx="2570232" cy="2068527"/>
+          </a:xfrm>
+          <a:prstGeom prst="rect">
+            <a:avLst/>
+          </a:prstGeom>
+        </p:spPr>
+      </p:pic>
+      <p:pic>
+        <p:nvPicPr>
+          <p:cNvPr id="14" name="Picture 13" descr="Graphical user interface, application&#10;&#10;Description automatically generated">
+            <a:extLst>
+              <a:ext uri="{FF2B5EF4-FFF2-40B4-BE49-F238E27FC236}">
+                <a16:creationId xmlns:a16="http://schemas.microsoft.com/office/drawing/2014/main" id="{4A6CEE77-66FF-8E47-3642-82367C1F03E9}"/>
+              </a:ext>
+            </a:extLst>
+          </p:cNvPr>
+          <p:cNvPicPr>
+            <a:picLocks noChangeAspect="1"/>
+          </p:cNvPicPr>
+          <p:nvPr/>
+        </p:nvPicPr>
+        <p:blipFill>
+          <a:blip r:embed="rId6">
+            <a:extLst>
+              <a:ext uri="{28A0092B-C50C-407E-A947-70E740481C1C}">
+                <a14:useLocalDpi xmlns:a14="http://schemas.microsoft.com/office/drawing/2010/main" val="0"/>
+              </a:ext>
+            </a:extLst>
+          </a:blip>
+          <a:stretch>
+            <a:fillRect/>
+          </a:stretch>
+        </p:blipFill>
+        <p:spPr>
+          <a:xfrm>
+            <a:off x="8792438" y="1431992"/>
+            <a:ext cx="2657882" cy="2068527"/>
+          </a:xfrm>
+          <a:prstGeom prst="rect">
+            <a:avLst/>
+          </a:prstGeom>
+        </p:spPr>
+      </p:pic>
+      <p:pic>
+        <p:nvPicPr>
+          <p:cNvPr id="16" name="Picture 15" descr="Graphical user interface, text, application&#10;&#10;Description automatically generated">
+            <a:extLst>
+              <a:ext uri="{FF2B5EF4-FFF2-40B4-BE49-F238E27FC236}">
+                <a16:creationId xmlns:a16="http://schemas.microsoft.com/office/drawing/2014/main" id="{29E397B8-BB90-5A61-21F4-76A663E4C998}"/>
+              </a:ext>
+            </a:extLst>
+          </p:cNvPr>
+          <p:cNvPicPr>
+            <a:picLocks noChangeAspect="1"/>
+          </p:cNvPicPr>
+          <p:nvPr/>
+        </p:nvPicPr>
+        <p:blipFill>
+          <a:blip r:embed="rId7">
+            <a:extLst>
+              <a:ext uri="{28A0092B-C50C-407E-A947-70E740481C1C}">
+                <a14:useLocalDpi xmlns:a14="http://schemas.microsoft.com/office/drawing/2010/main" val="0"/>
+              </a:ext>
+            </a:extLst>
+          </a:blip>
+          <a:stretch>
+            <a:fillRect/>
+          </a:stretch>
+        </p:blipFill>
+        <p:spPr>
+          <a:xfrm>
+            <a:off x="625307" y="3850567"/>
+            <a:ext cx="2541168" cy="2068527"/>
+          </a:xfrm>
+          <a:prstGeom prst="rect">
+            <a:avLst/>
+          </a:prstGeom>
         </p:spPr>
       </p:pic>
     </p:spTree>
     <p:extLst>
       <p:ext uri="{BB962C8B-B14F-4D97-AF65-F5344CB8AC3E}">
-        <p14:creationId xmlns:p14="http://schemas.microsoft.com/office/powerpoint/2010/main" val="2347019164"/>
+        <p14:creationId xmlns:p14="http://schemas.microsoft.com/office/powerpoint/2010/main" val="3782695643"/>
       </p:ext>
     </p:extLst>
   </p:cSld>
   <p:clrMapOvr>
     <a:overrideClrMapping bg1="dk1" tx1="lt1" bg2="dk2" tx2="lt2" accent1="accent1" accent2="accent2" accent3="accent3" accent4="accent4" accent5="accent5" accent6="accent6" hlink="hlink" folHlink="folHlink"/>
   </p:clrMapOvr>
-  <p:timing>
-    <p:tnLst>
-      <p:par>
-        <p:cTn id="1" dur="indefinite" restart="never" nodeType="tmRoot">
-          <p:childTnLst>
-            <p:seq concurrent="1" nextAc="seek">
-              <p:cTn id="2" dur="indefinite" nodeType="mainSeq">
-                <p:childTnLst>
-                  <p:par>
-                    <p:cTn id="3" fill="hold">
-                      <p:stCondLst>
-                        <p:cond delay="indefinite"/>
-                        <p:cond evt="onBegin" delay="0">
-                          <p:tn val="2"/>
-                        </p:cond>
-                      </p:stCondLst>
-                      <p:childTnLst>
-                        <p:par>
-                          <p:cTn id="4" fill="hold">
-                            <p:stCondLst>
-                              <p:cond delay="0"/>
-                            </p:stCondLst>
-                            <p:childTnLst>
-                              <p:par>
-                                <p:cTn id="5" presetID="10" presetClass="entr" presetSubtype="0" fill="hold" grpId="0" nodeType="withEffect">
-                                  <p:stCondLst>
-                                    <p:cond delay="1000"/>
-                                  </p:stCondLst>
-                                  <p:iterate type="lt">
-                                    <p:tmPct val="10000"/>
-                                  </p:iterate>
-                                  <p:childTnLst>
-                                    <p:set>
-                                      <p:cBhvr>
-                                        <p:cTn id="6" dur="1" fill="hold">
-                                          <p:stCondLst>
-                                            <p:cond delay="0"/>
-                                          </p:stCondLst>
-                                        </p:cTn>
-                                        <p:tgtEl>
-                                          <p:spTgt spid="2"/>
-                                        </p:tgtEl>
-                                        <p:attrNameLst>
-                                          <p:attrName>style.visibility</p:attrName>
-                                        </p:attrNameLst>
-                                      </p:cBhvr>
-                                      <p:to>
-                                        <p:strVal val="visible"/>
-                                      </p:to>
-                                    </p:set>
-                                    <p:animEffect transition="in" filter="fade">
-                                      <p:cBhvr>
-                                        <p:cTn id="7" dur="400"/>
-                                        <p:tgtEl>
-                                          <p:spTgt spid="2"/>
-                                        </p:tgtEl>
-                                      </p:cBhvr>
-                                    </p:animEffect>
-                                  </p:childTnLst>
-                                </p:cTn>
-                              </p:par>
-                            </p:childTnLst>
-                          </p:cTn>
-                        </p:par>
-                      </p:childTnLst>
-                    </p:cTn>
-                  </p:par>
-                </p:childTnLst>
-              </p:cTn>
-              <p:prevCondLst>
-                <p:cond evt="onPrev" delay="0">
-                  <p:tgtEl>
-                    <p:sldTgt/>
-                  </p:tgtEl>
-                </p:cond>
-              </p:prevCondLst>
-              <p:nextCondLst>
-                <p:cond evt="onNext" delay="0">
-                  <p:tgtEl>
-                    <p:sldTgt/>
-                  </p:tgtEl>
-                </p:cond>
-              </p:nextCondLst>
-            </p:seq>
-          </p:childTnLst>
-        </p:cTn>
-      </p:par>
-    </p:tnLst>
-    <p:bldLst>
-      <p:bldP spid="2" grpId="0"/>
-    </p:bldLst>
-  </p:timing>
+</p:sld>
+</file>
+
+<file path=ppt/slides/slide7.xml><?xml version="1.0" encoding="utf-8"?>
+<p:sld xmlns:a="http://schemas.openxmlformats.org/drawingml/2006/main" xmlns:r="http://schemas.openxmlformats.org/officeDocument/2006/relationships" xmlns:p="http://schemas.openxmlformats.org/presentationml/2006/main">
+  <p:cSld>
+    <p:bg>
+      <p:bgPr>
+        <a:blipFill rotWithShape="1">
+          <a:blip r:embed="rId2">
+            <a:duotone>
+              <a:schemeClr val="bg2">
+                <a:shade val="69000"/>
+                <a:hueMod val="91000"/>
+                <a:satMod val="164000"/>
+                <a:lumMod val="74000"/>
+              </a:schemeClr>
+              <a:schemeClr val="bg2">
+                <a:hueMod val="124000"/>
+                <a:satMod val="140000"/>
+                <a:lumMod val="142000"/>
+              </a:schemeClr>
+            </a:duotone>
+          </a:blip>
+          <a:stretch/>
+        </a:blipFill>
+        <a:effectLst/>
+      </p:bgPr>
+    </p:bg>
+    <p:spTree>
+      <p:nvGrpSpPr>
+        <p:cNvPr id="1" name=""/>
+        <p:cNvGrpSpPr/>
+        <p:nvPr/>
+      </p:nvGrpSpPr>
+      <p:grpSpPr>
+        <a:xfrm>
+          <a:off x="0" y="0"/>
+          <a:ext cx="0" cy="0"/>
+          <a:chOff x="0" y="0"/>
+          <a:chExt cx="0" cy="0"/>
+        </a:xfrm>
+      </p:grpSpPr>
+      <p:sp useBgFill="1">
+        <p:nvSpPr>
+          <p:cNvPr id="8" name="Rectangle 7">
+            <a:extLst>
+              <a:ext uri="{FF2B5EF4-FFF2-40B4-BE49-F238E27FC236}">
+                <a16:creationId xmlns:a16="http://schemas.microsoft.com/office/drawing/2014/main" id="{01109B5D-BC35-4376-98A2-F53B03E4E1B4}"/>
+              </a:ext>
+              <a:ext uri="{C183D7F6-B498-43B3-948B-1728B52AA6E4}">
+                <adec:decorative xmlns:adec="http://schemas.microsoft.com/office/drawing/2017/decorative" val="1"/>
+              </a:ext>
+            </a:extLst>
+          </p:cNvPr>
+          <p:cNvSpPr>
+            <a:spLocks noGrp="1" noRot="1" noChangeAspect="1" noMove="1" noResize="1" noEditPoints="1" noAdjustHandles="1" noChangeArrowheads="1" noChangeShapeType="1" noTextEdit="1"/>
+          </p:cNvSpPr>
+          <p:nvPr>
+            <p:extLst>
+              <p:ext uri="{386F3935-93C4-4BCD-93E2-E3B085C9AB24}">
+                <p16:designElem xmlns:p16="http://schemas.microsoft.com/office/powerpoint/2015/main" val="1"/>
+              </p:ext>
+            </p:extLst>
+          </p:nvPr>
+        </p:nvSpPr>
+        <p:spPr>
+          <a:xfrm>
+            <a:off x="0" y="0"/>
+            <a:ext cx="12192000" cy="6858000"/>
+          </a:xfrm>
+          <a:prstGeom prst="rect">
+            <a:avLst/>
+          </a:prstGeom>
+          <a:ln>
+            <a:noFill/>
+          </a:ln>
+        </p:spPr>
+        <p:style>
+          <a:lnRef idx="2">
+            <a:schemeClr val="accent1">
+              <a:shade val="50000"/>
+            </a:schemeClr>
+          </a:lnRef>
+          <a:fillRef idx="1">
+            <a:schemeClr val="accent1"/>
+          </a:fillRef>
+          <a:effectRef idx="0">
+            <a:schemeClr val="accent1"/>
+          </a:effectRef>
+          <a:fontRef idx="minor">
+            <a:schemeClr val="lt1"/>
+          </a:fontRef>
+        </p:style>
+      </p:sp>
+      <p:sp>
+        <p:nvSpPr>
+          <p:cNvPr id="10" name="Freeform 5">
+            <a:extLst>
+              <a:ext uri="{FF2B5EF4-FFF2-40B4-BE49-F238E27FC236}">
+                <a16:creationId xmlns:a16="http://schemas.microsoft.com/office/drawing/2014/main" id="{94D90C11-98A3-40E3-B04C-A3025D6458A3}"/>
+              </a:ext>
+              <a:ext uri="{C183D7F6-B498-43B3-948B-1728B52AA6E4}">
+                <adec:decorative xmlns:adec="http://schemas.microsoft.com/office/drawing/2017/decorative" val="1"/>
+              </a:ext>
+            </a:extLst>
+          </p:cNvPr>
+          <p:cNvSpPr>
+            <a:spLocks noGrp="1" noRot="1" noChangeAspect="1" noMove="1" noResize="1" noEditPoints="1" noAdjustHandles="1" noChangeArrowheads="1" noChangeShapeType="1" noTextEdit="1"/>
+          </p:cNvSpPr>
+          <p:nvPr>
+            <p:extLst>
+              <p:ext uri="{386F3935-93C4-4BCD-93E2-E3B085C9AB24}">
+                <p16:designElem xmlns:p16="http://schemas.microsoft.com/office/powerpoint/2015/main" val="1"/>
+              </p:ext>
+            </p:extLst>
+          </p:nvPr>
+        </p:nvSpPr>
+        <p:spPr bwMode="gray">
+          <a:xfrm>
+            <a:off x="0" y="0"/>
+            <a:ext cx="12192000" cy="6856413"/>
+          </a:xfrm>
+          <a:custGeom>
+            <a:avLst/>
+            <a:gdLst/>
+            <a:ahLst/>
+            <a:cxnLst/>
+            <a:rect l="0" t="0" r="r" b="b"/>
+            <a:pathLst>
+              <a:path w="15356" h="8638">
+                <a:moveTo>
+                  <a:pt x="0" y="0"/>
+                </a:moveTo>
+                <a:lnTo>
+                  <a:pt x="0" y="8638"/>
+                </a:lnTo>
+                <a:lnTo>
+                  <a:pt x="15356" y="8638"/>
+                </a:lnTo>
+                <a:lnTo>
+                  <a:pt x="15356" y="0"/>
+                </a:lnTo>
+                <a:lnTo>
+                  <a:pt x="0" y="0"/>
+                </a:lnTo>
+                <a:close/>
+                <a:moveTo>
+                  <a:pt x="14748" y="8038"/>
+                </a:moveTo>
+                <a:lnTo>
+                  <a:pt x="600" y="8038"/>
+                </a:lnTo>
+                <a:lnTo>
+                  <a:pt x="600" y="592"/>
+                </a:lnTo>
+                <a:lnTo>
+                  <a:pt x="14748" y="592"/>
+                </a:lnTo>
+                <a:lnTo>
+                  <a:pt x="14748" y="8038"/>
+                </a:lnTo>
+                <a:close/>
+              </a:path>
+            </a:pathLst>
+          </a:custGeom>
+          <a:solidFill>
+            <a:schemeClr val="tx1"/>
+          </a:solidFill>
+          <a:ln>
+            <a:noFill/>
+          </a:ln>
+        </p:spPr>
+      </p:sp>
+      <p:sp>
+        <p:nvSpPr>
+          <p:cNvPr id="2" name="Title 1">
+            <a:extLst>
+              <a:ext uri="{FF2B5EF4-FFF2-40B4-BE49-F238E27FC236}">
+                <a16:creationId xmlns:a16="http://schemas.microsoft.com/office/drawing/2014/main" id="{8A03DEFD-E491-B993-57A0-99260FEDABED}"/>
+              </a:ext>
+            </a:extLst>
+          </p:cNvPr>
+          <p:cNvSpPr>
+            <a:spLocks noGrp="1"/>
+          </p:cNvSpPr>
+          <p:nvPr>
+            <p:ph type="title"/>
+          </p:nvPr>
+        </p:nvSpPr>
+        <p:spPr>
+          <a:xfrm>
+            <a:off x="967790" y="1449324"/>
+            <a:ext cx="9206785" cy="748931"/>
+          </a:xfrm>
+        </p:spPr>
+        <p:txBody>
+          <a:bodyPr anchor="t">
+            <a:normAutofit/>
+          </a:bodyPr>
+          <a:lstStyle/>
+          <a:p>
+            <a:r>
+              <a:rPr lang="ru-RU" sz="2800" b="1" dirty="0">
+                <a:solidFill>
+                  <a:schemeClr val="tx1"/>
+                </a:solidFill>
+                <a:latin typeface="+mn-lt"/>
+              </a:rPr>
+              <a:t>Скринкасты</a:t>
+            </a:r>
+            <a:r>
+              <a:rPr lang="en-SG" sz="2800" b="1" dirty="0">
+                <a:solidFill>
+                  <a:schemeClr val="tx1"/>
+                </a:solidFill>
+                <a:latin typeface="+mn-lt"/>
+              </a:rPr>
+              <a:t>,</a:t>
+            </a:r>
+            <a:r>
+              <a:rPr lang="ru-RU" sz="2800" b="1" dirty="0">
+                <a:solidFill>
+                  <a:schemeClr val="tx1"/>
+                </a:solidFill>
+                <a:latin typeface="+mn-lt"/>
+              </a:rPr>
+              <a:t> показывающие работу приложения</a:t>
+            </a:r>
+            <a:endParaRPr lang="en-SG" sz="2800" b="1" dirty="0">
+              <a:solidFill>
+                <a:schemeClr val="tx1"/>
+              </a:solidFill>
+            </a:endParaRPr>
+          </a:p>
+        </p:txBody>
+      </p:sp>
+      <p:sp>
+        <p:nvSpPr>
+          <p:cNvPr id="12" name="Rectangle 11">
+            <a:extLst>
+              <a:ext uri="{FF2B5EF4-FFF2-40B4-BE49-F238E27FC236}">
+                <a16:creationId xmlns:a16="http://schemas.microsoft.com/office/drawing/2014/main" id="{A3B28FB1-97C9-4A9E-A45B-356508C2C38B}"/>
+              </a:ext>
+              <a:ext uri="{C183D7F6-B498-43B3-948B-1728B52AA6E4}">
+                <adec:decorative xmlns:adec="http://schemas.microsoft.com/office/drawing/2017/decorative" val="1"/>
+              </a:ext>
+            </a:extLst>
+          </p:cNvPr>
+          <p:cNvSpPr>
+            <a:spLocks noGrp="1" noRot="1" noChangeAspect="1" noMove="1" noResize="1" noEditPoints="1" noAdjustHandles="1" noChangeArrowheads="1" noChangeShapeType="1" noTextEdit="1"/>
+          </p:cNvSpPr>
+          <p:nvPr>
+            <p:extLst>
+              <p:ext uri="{386F3935-93C4-4BCD-93E2-E3B085C9AB24}">
+                <p16:designElem xmlns:p16="http://schemas.microsoft.com/office/powerpoint/2015/main" val="1"/>
+              </p:ext>
+            </p:extLst>
+          </p:nvPr>
+        </p:nvSpPr>
+        <p:spPr>
+          <a:xfrm>
+            <a:off x="10437812" y="0"/>
+            <a:ext cx="685800" cy="1143000"/>
+          </a:xfrm>
+          <a:prstGeom prst="rect">
+            <a:avLst/>
+          </a:prstGeom>
+          <a:solidFill>
+            <a:schemeClr val="accent1"/>
+          </a:solidFill>
+          <a:ln>
+            <a:noFill/>
+          </a:ln>
+        </p:spPr>
+        <p:style>
+          <a:lnRef idx="1">
+            <a:schemeClr val="accent1"/>
+          </a:lnRef>
+          <a:fillRef idx="3">
+            <a:schemeClr val="accent1"/>
+          </a:fillRef>
+          <a:effectRef idx="2">
+            <a:schemeClr val="accent1"/>
+          </a:effectRef>
+          <a:fontRef idx="minor">
+            <a:schemeClr val="lt1"/>
+          </a:fontRef>
+        </p:style>
+      </p:sp>
+      <p:sp>
+        <p:nvSpPr>
+          <p:cNvPr id="3" name="Content Placeholder 2">
+            <a:extLst>
+              <a:ext uri="{FF2B5EF4-FFF2-40B4-BE49-F238E27FC236}">
+                <a16:creationId xmlns:a16="http://schemas.microsoft.com/office/drawing/2014/main" id="{AD6040EA-249F-3DF4-AFE3-7FF05C701D8F}"/>
+              </a:ext>
+            </a:extLst>
+          </p:cNvPr>
+          <p:cNvSpPr>
+            <a:spLocks noGrp="1"/>
+          </p:cNvSpPr>
+          <p:nvPr>
+            <p:ph idx="1"/>
+          </p:nvPr>
+        </p:nvSpPr>
+        <p:spPr>
+          <a:xfrm>
+            <a:off x="1542902" y="2114343"/>
+            <a:ext cx="8515498" cy="4391640"/>
+          </a:xfrm>
+        </p:spPr>
+        <p:txBody>
+          <a:bodyPr>
+            <a:normAutofit/>
+          </a:bodyPr>
+          <a:lstStyle/>
+          <a:p>
+            <a:endParaRPr lang="en-SG" dirty="0">
+              <a:solidFill>
+                <a:schemeClr val="tx1"/>
+              </a:solidFill>
+            </a:endParaRPr>
+          </a:p>
+        </p:txBody>
+      </p:sp>
+    </p:spTree>
+    <p:extLst>
+      <p:ext uri="{BB962C8B-B14F-4D97-AF65-F5344CB8AC3E}">
+        <p14:creationId xmlns:p14="http://schemas.microsoft.com/office/powerpoint/2010/main" val="1546261090"/>
+      </p:ext>
+    </p:extLst>
+  </p:cSld>
+  <p:clrMapOvr>
+    <a:overrideClrMapping bg1="dk1" tx1="lt1" bg2="dk2" tx2="lt2" accent1="accent1" accent2="accent2" accent3="accent3" accent4="accent4" accent5="accent5" accent6="accent6" hlink="hlink" folHlink="folHlink"/>
+  </p:clrMapOvr>
+</p:sld>
+</file>
+
+<file path=ppt/slides/slide8.xml><?xml version="1.0" encoding="utf-8"?>
+<p:sld xmlns:a="http://schemas.openxmlformats.org/drawingml/2006/main" xmlns:r="http://schemas.openxmlformats.org/officeDocument/2006/relationships" xmlns:p="http://schemas.openxmlformats.org/presentationml/2006/main">
+  <p:cSld>
+    <p:bg>
+      <p:bgPr>
+        <a:blipFill rotWithShape="1">
+          <a:blip r:embed="rId2">
+            <a:duotone>
+              <a:schemeClr val="bg2">
+                <a:shade val="69000"/>
+                <a:hueMod val="91000"/>
+                <a:satMod val="164000"/>
+                <a:lumMod val="74000"/>
+              </a:schemeClr>
+              <a:schemeClr val="bg2">
+                <a:hueMod val="124000"/>
+                <a:satMod val="140000"/>
+                <a:lumMod val="142000"/>
+              </a:schemeClr>
+            </a:duotone>
+          </a:blip>
+          <a:stretch/>
+        </a:blipFill>
+        <a:effectLst/>
+      </p:bgPr>
+    </p:bg>
+    <p:spTree>
+      <p:nvGrpSpPr>
+        <p:cNvPr id="1" name=""/>
+        <p:cNvGrpSpPr/>
+        <p:nvPr/>
+      </p:nvGrpSpPr>
+      <p:grpSpPr>
+        <a:xfrm>
+          <a:off x="0" y="0"/>
+          <a:ext cx="0" cy="0"/>
+          <a:chOff x="0" y="0"/>
+          <a:chExt cx="0" cy="0"/>
+        </a:xfrm>
+      </p:grpSpPr>
+      <p:sp useBgFill="1">
+        <p:nvSpPr>
+          <p:cNvPr id="8" name="Rectangle 7">
+            <a:extLst>
+              <a:ext uri="{FF2B5EF4-FFF2-40B4-BE49-F238E27FC236}">
+                <a16:creationId xmlns:a16="http://schemas.microsoft.com/office/drawing/2014/main" id="{01109B5D-BC35-4376-98A2-F53B03E4E1B4}"/>
+              </a:ext>
+              <a:ext uri="{C183D7F6-B498-43B3-948B-1728B52AA6E4}">
+                <adec:decorative xmlns:adec="http://schemas.microsoft.com/office/drawing/2017/decorative" val="1"/>
+              </a:ext>
+            </a:extLst>
+          </p:cNvPr>
+          <p:cNvSpPr>
+            <a:spLocks noGrp="1" noRot="1" noChangeAspect="1" noMove="1" noResize="1" noEditPoints="1" noAdjustHandles="1" noChangeArrowheads="1" noChangeShapeType="1" noTextEdit="1"/>
+          </p:cNvSpPr>
+          <p:nvPr>
+            <p:extLst>
+              <p:ext uri="{386F3935-93C4-4BCD-93E2-E3B085C9AB24}">
+                <p16:designElem xmlns:p16="http://schemas.microsoft.com/office/powerpoint/2015/main" val="1"/>
+              </p:ext>
+            </p:extLst>
+          </p:nvPr>
+        </p:nvSpPr>
+        <p:spPr>
+          <a:xfrm>
+            <a:off x="0" y="0"/>
+            <a:ext cx="12192000" cy="6858000"/>
+          </a:xfrm>
+          <a:prstGeom prst="rect">
+            <a:avLst/>
+          </a:prstGeom>
+          <a:ln>
+            <a:noFill/>
+          </a:ln>
+        </p:spPr>
+        <p:style>
+          <a:lnRef idx="2">
+            <a:schemeClr val="accent1">
+              <a:shade val="50000"/>
+            </a:schemeClr>
+          </a:lnRef>
+          <a:fillRef idx="1">
+            <a:schemeClr val="accent1"/>
+          </a:fillRef>
+          <a:effectRef idx="0">
+            <a:schemeClr val="accent1"/>
+          </a:effectRef>
+          <a:fontRef idx="minor">
+            <a:schemeClr val="lt1"/>
+          </a:fontRef>
+        </p:style>
+      </p:sp>
+      <p:sp>
+        <p:nvSpPr>
+          <p:cNvPr id="10" name="Freeform 5">
+            <a:extLst>
+              <a:ext uri="{FF2B5EF4-FFF2-40B4-BE49-F238E27FC236}">
+                <a16:creationId xmlns:a16="http://schemas.microsoft.com/office/drawing/2014/main" id="{94D90C11-98A3-40E3-B04C-A3025D6458A3}"/>
+              </a:ext>
+              <a:ext uri="{C183D7F6-B498-43B3-948B-1728B52AA6E4}">
+                <adec:decorative xmlns:adec="http://schemas.microsoft.com/office/drawing/2017/decorative" val="1"/>
+              </a:ext>
+            </a:extLst>
+          </p:cNvPr>
+          <p:cNvSpPr>
+            <a:spLocks noGrp="1" noRot="1" noChangeAspect="1" noMove="1" noResize="1" noEditPoints="1" noAdjustHandles="1" noChangeArrowheads="1" noChangeShapeType="1" noTextEdit="1"/>
+          </p:cNvSpPr>
+          <p:nvPr>
+            <p:extLst>
+              <p:ext uri="{386F3935-93C4-4BCD-93E2-E3B085C9AB24}">
+                <p16:designElem xmlns:p16="http://schemas.microsoft.com/office/powerpoint/2015/main" val="1"/>
+              </p:ext>
+            </p:extLst>
+          </p:nvPr>
+        </p:nvSpPr>
+        <p:spPr bwMode="gray">
+          <a:xfrm>
+            <a:off x="0" y="0"/>
+            <a:ext cx="12192000" cy="6856413"/>
+          </a:xfrm>
+          <a:custGeom>
+            <a:avLst/>
+            <a:gdLst/>
+            <a:ahLst/>
+            <a:cxnLst/>
+            <a:rect l="0" t="0" r="r" b="b"/>
+            <a:pathLst>
+              <a:path w="15356" h="8638">
+                <a:moveTo>
+                  <a:pt x="0" y="0"/>
+                </a:moveTo>
+                <a:lnTo>
+                  <a:pt x="0" y="8638"/>
+                </a:lnTo>
+                <a:lnTo>
+                  <a:pt x="15356" y="8638"/>
+                </a:lnTo>
+                <a:lnTo>
+                  <a:pt x="15356" y="0"/>
+                </a:lnTo>
+                <a:lnTo>
+                  <a:pt x="0" y="0"/>
+                </a:lnTo>
+                <a:close/>
+                <a:moveTo>
+                  <a:pt x="14748" y="8038"/>
+                </a:moveTo>
+                <a:lnTo>
+                  <a:pt x="600" y="8038"/>
+                </a:lnTo>
+                <a:lnTo>
+                  <a:pt x="600" y="592"/>
+                </a:lnTo>
+                <a:lnTo>
+                  <a:pt x="14748" y="592"/>
+                </a:lnTo>
+                <a:lnTo>
+                  <a:pt x="14748" y="8038"/>
+                </a:lnTo>
+                <a:close/>
+              </a:path>
+            </a:pathLst>
+          </a:custGeom>
+          <a:solidFill>
+            <a:schemeClr val="tx1"/>
+          </a:solidFill>
+          <a:ln>
+            <a:noFill/>
+          </a:ln>
+        </p:spPr>
+      </p:sp>
+      <p:sp>
+        <p:nvSpPr>
+          <p:cNvPr id="2" name="Title 1">
+            <a:extLst>
+              <a:ext uri="{FF2B5EF4-FFF2-40B4-BE49-F238E27FC236}">
+                <a16:creationId xmlns:a16="http://schemas.microsoft.com/office/drawing/2014/main" id="{FC1D0639-0367-DE71-8941-06A76C3D7FDF}"/>
+              </a:ext>
+            </a:extLst>
+          </p:cNvPr>
+          <p:cNvSpPr>
+            <a:spLocks noGrp="1"/>
+          </p:cNvSpPr>
+          <p:nvPr>
+            <p:ph type="title"/>
+          </p:nvPr>
+        </p:nvSpPr>
+        <p:spPr>
+          <a:xfrm>
+            <a:off x="2168517" y="876669"/>
+            <a:ext cx="7566609" cy="915185"/>
+          </a:xfrm>
+        </p:spPr>
+        <p:txBody>
+          <a:bodyPr anchor="t">
+            <a:normAutofit/>
+          </a:bodyPr>
+          <a:lstStyle/>
+          <a:p>
+            <a:r>
+              <a:rPr lang="ru-RU" sz="2800" b="1" dirty="0">
+                <a:solidFill>
+                  <a:schemeClr val="tx1"/>
+                </a:solidFill>
+                <a:latin typeface="+mn-lt"/>
+              </a:rPr>
+              <a:t>В</a:t>
+            </a:r>
+            <a:r>
+              <a:rPr lang="ru-RU" sz="2800" b="1" i="0" dirty="0">
+                <a:solidFill>
+                  <a:schemeClr val="tx1"/>
+                </a:solidFill>
+                <a:effectLst/>
+                <a:latin typeface="+mn-lt"/>
+              </a:rPr>
+              <a:t>озможности для доработки и развития</a:t>
+            </a:r>
+            <a:endParaRPr lang="en-SG" sz="2800" b="1" dirty="0">
+              <a:solidFill>
+                <a:schemeClr val="tx1"/>
+              </a:solidFill>
+            </a:endParaRPr>
+          </a:p>
+        </p:txBody>
+      </p:sp>
+      <p:sp>
+        <p:nvSpPr>
+          <p:cNvPr id="12" name="Rectangle 11">
+            <a:extLst>
+              <a:ext uri="{FF2B5EF4-FFF2-40B4-BE49-F238E27FC236}">
+                <a16:creationId xmlns:a16="http://schemas.microsoft.com/office/drawing/2014/main" id="{A3B28FB1-97C9-4A9E-A45B-356508C2C38B}"/>
+              </a:ext>
+              <a:ext uri="{C183D7F6-B498-43B3-948B-1728B52AA6E4}">
+                <adec:decorative xmlns:adec="http://schemas.microsoft.com/office/drawing/2017/decorative" val="1"/>
+              </a:ext>
+            </a:extLst>
+          </p:cNvPr>
+          <p:cNvSpPr>
+            <a:spLocks noGrp="1" noRot="1" noChangeAspect="1" noMove="1" noResize="1" noEditPoints="1" noAdjustHandles="1" noChangeArrowheads="1" noChangeShapeType="1" noTextEdit="1"/>
+          </p:cNvSpPr>
+          <p:nvPr>
+            <p:extLst>
+              <p:ext uri="{386F3935-93C4-4BCD-93E2-E3B085C9AB24}">
+                <p16:designElem xmlns:p16="http://schemas.microsoft.com/office/powerpoint/2015/main" val="1"/>
+              </p:ext>
+            </p:extLst>
+          </p:nvPr>
+        </p:nvSpPr>
+        <p:spPr>
+          <a:xfrm>
+            <a:off x="10437812" y="0"/>
+            <a:ext cx="685800" cy="1143000"/>
+          </a:xfrm>
+          <a:prstGeom prst="rect">
+            <a:avLst/>
+          </a:prstGeom>
+          <a:solidFill>
+            <a:schemeClr val="accent1"/>
+          </a:solidFill>
+          <a:ln>
+            <a:noFill/>
+          </a:ln>
+        </p:spPr>
+        <p:style>
+          <a:lnRef idx="1">
+            <a:schemeClr val="accent1"/>
+          </a:lnRef>
+          <a:fillRef idx="3">
+            <a:schemeClr val="accent1"/>
+          </a:fillRef>
+          <a:effectRef idx="2">
+            <a:schemeClr val="accent1"/>
+          </a:effectRef>
+          <a:fontRef idx="minor">
+            <a:schemeClr val="lt1"/>
+          </a:fontRef>
+        </p:style>
+      </p:sp>
+      <p:sp>
+        <p:nvSpPr>
+          <p:cNvPr id="3" name="Content Placeholder 2">
+            <a:extLst>
+              <a:ext uri="{FF2B5EF4-FFF2-40B4-BE49-F238E27FC236}">
+                <a16:creationId xmlns:a16="http://schemas.microsoft.com/office/drawing/2014/main" id="{C61E4F74-06C2-D283-8EC2-7AE9FBC1E062}"/>
+              </a:ext>
+            </a:extLst>
+          </p:cNvPr>
+          <p:cNvSpPr>
+            <a:spLocks noGrp="1"/>
+          </p:cNvSpPr>
+          <p:nvPr>
+            <p:ph idx="1"/>
+          </p:nvPr>
+        </p:nvSpPr>
+        <p:spPr>
+          <a:xfrm>
+            <a:off x="2327993" y="1477033"/>
+            <a:ext cx="7139279" cy="4391640"/>
+          </a:xfrm>
+        </p:spPr>
+        <p:txBody>
+          <a:bodyPr>
+            <a:normAutofit/>
+          </a:bodyPr>
+          <a:lstStyle/>
+          <a:p>
+            <a:r>
+              <a:rPr lang="ru-RU" dirty="0">
+                <a:solidFill>
+                  <a:schemeClr val="tx1"/>
+                </a:solidFill>
+              </a:rPr>
+              <a:t>В будущем мы планируем ревлизовать больше уровней и персонажей с различными способностями. Также будет реализован выбор музыки для </a:t>
+            </a:r>
+            <a:r>
+              <a:rPr lang="en-SG" dirty="0" err="1">
+                <a:solidFill>
+                  <a:schemeClr val="tx1"/>
+                </a:solidFill>
+              </a:rPr>
+              <a:t>dragonfight</a:t>
+            </a:r>
+            <a:r>
+              <a:rPr lang="en-SG" dirty="0">
+                <a:solidFill>
+                  <a:schemeClr val="tx1"/>
+                </a:solidFill>
+              </a:rPr>
+              <a:t>.</a:t>
+            </a:r>
+            <a:r>
+              <a:rPr lang="ru-RU" dirty="0">
+                <a:solidFill>
+                  <a:schemeClr val="tx1"/>
+                </a:solidFill>
+              </a:rPr>
+              <a:t> И будут дальнейшие улучшения графики.</a:t>
+            </a:r>
+            <a:endParaRPr lang="en-SG" dirty="0">
+              <a:solidFill>
+                <a:schemeClr val="tx1"/>
+              </a:solidFill>
+            </a:endParaRPr>
+          </a:p>
+        </p:txBody>
+      </p:sp>
+    </p:spTree>
+    <p:extLst>
+      <p:ext uri="{BB962C8B-B14F-4D97-AF65-F5344CB8AC3E}">
+        <p14:creationId xmlns:p14="http://schemas.microsoft.com/office/powerpoint/2010/main" val="1756463326"/>
+      </p:ext>
+    </p:extLst>
+  </p:cSld>
+  <p:clrMapOvr>
+    <a:overrideClrMapping bg1="dk1" tx1="lt1" bg2="dk2" tx2="lt2" accent1="accent1" accent2="accent2" accent3="accent3" accent4="accent4" accent5="accent5" accent6="accent6" hlink="hlink" folHlink="folHlink"/>
+  </p:clrMapOvr>
+</p:sld>
+</file>
+
+<file path=ppt/slides/slide9.xml><?xml version="1.0" encoding="utf-8"?>
+<p:sld xmlns:a="http://schemas.openxmlformats.org/drawingml/2006/main" xmlns:r="http://schemas.openxmlformats.org/officeDocument/2006/relationships" xmlns:p="http://schemas.openxmlformats.org/presentationml/2006/main">
+  <p:cSld>
+    <p:bg>
+      <p:bgPr>
+        <a:blipFill rotWithShape="1">
+          <a:blip r:embed="rId2">
+            <a:duotone>
+              <a:schemeClr val="bg2">
+                <a:shade val="69000"/>
+                <a:hueMod val="91000"/>
+                <a:satMod val="164000"/>
+                <a:lumMod val="74000"/>
+              </a:schemeClr>
+              <a:schemeClr val="bg2">
+                <a:hueMod val="124000"/>
+                <a:satMod val="140000"/>
+                <a:lumMod val="142000"/>
+              </a:schemeClr>
+            </a:duotone>
+          </a:blip>
+          <a:stretch/>
+        </a:blipFill>
+        <a:effectLst/>
+      </p:bgPr>
+    </p:bg>
+    <p:spTree>
+      <p:nvGrpSpPr>
+        <p:cNvPr id="1" name=""/>
+        <p:cNvGrpSpPr/>
+        <p:nvPr/>
+      </p:nvGrpSpPr>
+      <p:grpSpPr>
+        <a:xfrm>
+          <a:off x="0" y="0"/>
+          <a:ext cx="0" cy="0"/>
+          <a:chOff x="0" y="0"/>
+          <a:chExt cx="0" cy="0"/>
+        </a:xfrm>
+      </p:grpSpPr>
+      <p:sp useBgFill="1">
+        <p:nvSpPr>
+          <p:cNvPr id="8" name="Rectangle 7">
+            <a:extLst>
+              <a:ext uri="{FF2B5EF4-FFF2-40B4-BE49-F238E27FC236}">
+                <a16:creationId xmlns:a16="http://schemas.microsoft.com/office/drawing/2014/main" id="{01109B5D-BC35-4376-98A2-F53B03E4E1B4}"/>
+              </a:ext>
+              <a:ext uri="{C183D7F6-B498-43B3-948B-1728B52AA6E4}">
+                <adec:decorative xmlns:adec="http://schemas.microsoft.com/office/drawing/2017/decorative" val="1"/>
+              </a:ext>
+            </a:extLst>
+          </p:cNvPr>
+          <p:cNvSpPr>
+            <a:spLocks noGrp="1" noRot="1" noChangeAspect="1" noMove="1" noResize="1" noEditPoints="1" noAdjustHandles="1" noChangeArrowheads="1" noChangeShapeType="1" noTextEdit="1"/>
+          </p:cNvSpPr>
+          <p:nvPr>
+            <p:extLst>
+              <p:ext uri="{386F3935-93C4-4BCD-93E2-E3B085C9AB24}">
+                <p16:designElem xmlns:p16="http://schemas.microsoft.com/office/powerpoint/2015/main" val="1"/>
+              </p:ext>
+            </p:extLst>
+          </p:nvPr>
+        </p:nvSpPr>
+        <p:spPr>
+          <a:xfrm>
+            <a:off x="0" y="0"/>
+            <a:ext cx="12192000" cy="6858000"/>
+          </a:xfrm>
+          <a:prstGeom prst="rect">
+            <a:avLst/>
+          </a:prstGeom>
+          <a:ln>
+            <a:noFill/>
+          </a:ln>
+        </p:spPr>
+        <p:style>
+          <a:lnRef idx="2">
+            <a:schemeClr val="accent1">
+              <a:shade val="50000"/>
+            </a:schemeClr>
+          </a:lnRef>
+          <a:fillRef idx="1">
+            <a:schemeClr val="accent1"/>
+          </a:fillRef>
+          <a:effectRef idx="0">
+            <a:schemeClr val="accent1"/>
+          </a:effectRef>
+          <a:fontRef idx="minor">
+            <a:schemeClr val="lt1"/>
+          </a:fontRef>
+        </p:style>
+      </p:sp>
+      <p:sp>
+        <p:nvSpPr>
+          <p:cNvPr id="10" name="Freeform 5">
+            <a:extLst>
+              <a:ext uri="{FF2B5EF4-FFF2-40B4-BE49-F238E27FC236}">
+                <a16:creationId xmlns:a16="http://schemas.microsoft.com/office/drawing/2014/main" id="{94D90C11-98A3-40E3-B04C-A3025D6458A3}"/>
+              </a:ext>
+              <a:ext uri="{C183D7F6-B498-43B3-948B-1728B52AA6E4}">
+                <adec:decorative xmlns:adec="http://schemas.microsoft.com/office/drawing/2017/decorative" val="1"/>
+              </a:ext>
+            </a:extLst>
+          </p:cNvPr>
+          <p:cNvSpPr>
+            <a:spLocks noGrp="1" noRot="1" noChangeAspect="1" noMove="1" noResize="1" noEditPoints="1" noAdjustHandles="1" noChangeArrowheads="1" noChangeShapeType="1" noTextEdit="1"/>
+          </p:cNvSpPr>
+          <p:nvPr>
+            <p:extLst>
+              <p:ext uri="{386F3935-93C4-4BCD-93E2-E3B085C9AB24}">
+                <p16:designElem xmlns:p16="http://schemas.microsoft.com/office/powerpoint/2015/main" val="1"/>
+              </p:ext>
+            </p:extLst>
+          </p:nvPr>
+        </p:nvSpPr>
+        <p:spPr bwMode="gray">
+          <a:xfrm>
+            <a:off x="0" y="0"/>
+            <a:ext cx="12192000" cy="6856413"/>
+          </a:xfrm>
+          <a:custGeom>
+            <a:avLst/>
+            <a:gdLst/>
+            <a:ahLst/>
+            <a:cxnLst/>
+            <a:rect l="0" t="0" r="r" b="b"/>
+            <a:pathLst>
+              <a:path w="15356" h="8638">
+                <a:moveTo>
+                  <a:pt x="0" y="0"/>
+                </a:moveTo>
+                <a:lnTo>
+                  <a:pt x="0" y="8638"/>
+                </a:lnTo>
+                <a:lnTo>
+                  <a:pt x="15356" y="8638"/>
+                </a:lnTo>
+                <a:lnTo>
+                  <a:pt x="15356" y="0"/>
+                </a:lnTo>
+                <a:lnTo>
+                  <a:pt x="0" y="0"/>
+                </a:lnTo>
+                <a:close/>
+                <a:moveTo>
+                  <a:pt x="14748" y="8038"/>
+                </a:moveTo>
+                <a:lnTo>
+                  <a:pt x="600" y="8038"/>
+                </a:lnTo>
+                <a:lnTo>
+                  <a:pt x="600" y="592"/>
+                </a:lnTo>
+                <a:lnTo>
+                  <a:pt x="14748" y="592"/>
+                </a:lnTo>
+                <a:lnTo>
+                  <a:pt x="14748" y="8038"/>
+                </a:lnTo>
+                <a:close/>
+              </a:path>
+            </a:pathLst>
+          </a:custGeom>
+          <a:solidFill>
+            <a:schemeClr val="tx1"/>
+          </a:solidFill>
+          <a:ln>
+            <a:noFill/>
+          </a:ln>
+        </p:spPr>
+      </p:sp>
+      <p:sp>
+        <p:nvSpPr>
+          <p:cNvPr id="2" name="Title 1">
+            <a:extLst>
+              <a:ext uri="{FF2B5EF4-FFF2-40B4-BE49-F238E27FC236}">
+                <a16:creationId xmlns:a16="http://schemas.microsoft.com/office/drawing/2014/main" id="{6DF1C0CF-B1A7-B0FD-0732-4B5A575F7CA9}"/>
+              </a:ext>
+            </a:extLst>
+          </p:cNvPr>
+          <p:cNvSpPr>
+            <a:spLocks noGrp="1"/>
+          </p:cNvSpPr>
+          <p:nvPr>
+            <p:ph type="title"/>
+          </p:nvPr>
+        </p:nvSpPr>
+        <p:spPr>
+          <a:xfrm>
+            <a:off x="3288055" y="724662"/>
+            <a:ext cx="5615889" cy="1507236"/>
+          </a:xfrm>
+        </p:spPr>
+        <p:txBody>
+          <a:bodyPr anchor="t">
+            <a:normAutofit/>
+          </a:bodyPr>
+          <a:lstStyle/>
+          <a:p>
+            <a:r>
+              <a:rPr lang="ru-RU" sz="2800" dirty="0">
+                <a:solidFill>
+                  <a:schemeClr val="tx1"/>
+                </a:solidFill>
+              </a:rPr>
+              <a:t>Ссылка на проект в гитхабе:</a:t>
+            </a:r>
+            <a:endParaRPr lang="en-SG" sz="2800" dirty="0">
+              <a:solidFill>
+                <a:schemeClr val="tx1"/>
+              </a:solidFill>
+            </a:endParaRPr>
+          </a:p>
+        </p:txBody>
+      </p:sp>
+      <p:sp>
+        <p:nvSpPr>
+          <p:cNvPr id="12" name="Rectangle 11">
+            <a:extLst>
+              <a:ext uri="{FF2B5EF4-FFF2-40B4-BE49-F238E27FC236}">
+                <a16:creationId xmlns:a16="http://schemas.microsoft.com/office/drawing/2014/main" id="{A3B28FB1-97C9-4A9E-A45B-356508C2C38B}"/>
+              </a:ext>
+              <a:ext uri="{C183D7F6-B498-43B3-948B-1728B52AA6E4}">
+                <adec:decorative xmlns:adec="http://schemas.microsoft.com/office/drawing/2017/decorative" val="1"/>
+              </a:ext>
+            </a:extLst>
+          </p:cNvPr>
+          <p:cNvSpPr>
+            <a:spLocks noGrp="1" noRot="1" noChangeAspect="1" noMove="1" noResize="1" noEditPoints="1" noAdjustHandles="1" noChangeArrowheads="1" noChangeShapeType="1" noTextEdit="1"/>
+          </p:cNvSpPr>
+          <p:nvPr>
+            <p:extLst>
+              <p:ext uri="{386F3935-93C4-4BCD-93E2-E3B085C9AB24}">
+                <p16:designElem xmlns:p16="http://schemas.microsoft.com/office/powerpoint/2015/main" val="1"/>
+              </p:ext>
+            </p:extLst>
+          </p:nvPr>
+        </p:nvSpPr>
+        <p:spPr>
+          <a:xfrm>
+            <a:off x="10437812" y="0"/>
+            <a:ext cx="685800" cy="1143000"/>
+          </a:xfrm>
+          <a:prstGeom prst="rect">
+            <a:avLst/>
+          </a:prstGeom>
+          <a:solidFill>
+            <a:schemeClr val="accent1"/>
+          </a:solidFill>
+          <a:ln>
+            <a:noFill/>
+          </a:ln>
+        </p:spPr>
+        <p:style>
+          <a:lnRef idx="1">
+            <a:schemeClr val="accent1"/>
+          </a:lnRef>
+          <a:fillRef idx="3">
+            <a:schemeClr val="accent1"/>
+          </a:fillRef>
+          <a:effectRef idx="2">
+            <a:schemeClr val="accent1"/>
+          </a:effectRef>
+          <a:fontRef idx="minor">
+            <a:schemeClr val="lt1"/>
+          </a:fontRef>
+        </p:style>
+      </p:sp>
+      <p:sp>
+        <p:nvSpPr>
+          <p:cNvPr id="3" name="Content Placeholder 2">
+            <a:extLst>
+              <a:ext uri="{FF2B5EF4-FFF2-40B4-BE49-F238E27FC236}">
+                <a16:creationId xmlns:a16="http://schemas.microsoft.com/office/drawing/2014/main" id="{751F0381-076C-B397-3CEC-EDC6A136D7C0}"/>
+              </a:ext>
+            </a:extLst>
+          </p:cNvPr>
+          <p:cNvSpPr>
+            <a:spLocks noGrp="1"/>
+          </p:cNvSpPr>
+          <p:nvPr>
+            <p:ph idx="1"/>
+          </p:nvPr>
+        </p:nvSpPr>
+        <p:spPr>
+          <a:xfrm>
+            <a:off x="1631974" y="1615440"/>
+            <a:ext cx="7197990" cy="416560"/>
+          </a:xfrm>
+        </p:spPr>
+        <p:txBody>
+          <a:bodyPr>
+            <a:normAutofit/>
+          </a:bodyPr>
+          <a:lstStyle/>
+          <a:p>
+            <a:r>
+              <a:rPr lang="en-SG" dirty="0">
+                <a:solidFill>
+                  <a:schemeClr val="tx1"/>
+                </a:solidFill>
+              </a:rPr>
+              <a:t>https://github.com/VeraPavlovskaya/PyGameProject.git</a:t>
+            </a:r>
+          </a:p>
+        </p:txBody>
+      </p:sp>
+    </p:spTree>
+    <p:extLst>
+      <p:ext uri="{BB962C8B-B14F-4D97-AF65-F5344CB8AC3E}">
+        <p14:creationId xmlns:p14="http://schemas.microsoft.com/office/powerpoint/2010/main" val="1109460163"/>
+      </p:ext>
+    </p:extLst>
+  </p:cSld>
+  <p:clrMapOvr>
+    <a:overrideClrMapping bg1="dk1" tx1="lt1" bg2="dk2" tx2="lt2" accent1="accent1" accent2="accent2" accent3="accent3" accent4="accent4" accent5="accent5" accent6="accent6" hlink="hlink" folHlink="folHlink"/>
+  </p:clrMapOvr>
 </p:sld>
 </file>
 

</xml_diff>

<commit_message>
presentation is almost done
</commit_message>
<xml_diff>
--- a/presentation.pptx
+++ b/presentation.pptx
@@ -135,6 +135,9 @@
           </p14:sldIdLst>
         </p14:section>
       </p14:sectionLst>
+    </p:ext>
+    <p:ext uri="{EFAFB233-063F-42B5-8137-9DF3F51BA10A}">
+      <p15:sldGuideLst xmlns:p15="http://schemas.microsoft.com/office/powerpoint/2012/main"/>
     </p:ext>
   </p:extLst>
 </p:presentation>
@@ -896,7 +899,7 @@
           <a:p>
             <a:fld id="{2F3E8B1C-86EF-43CF-8304-249481088644}" type="datetimeFigureOut">
               <a:rPr lang="en-US" smtClean="0"/>
-              <a:t>1/17/2023</a:t>
+              <a:t>1/18/2023</a:t>
             </a:fld>
             <a:endParaRPr lang="en-US"/>
           </a:p>
@@ -1985,7 +1988,7 @@
             <a:fld id="{2F3E8B1C-86EF-43CF-8304-249481088644}" type="datetimeFigureOut">
               <a:rPr lang="en-US" smtClean="0"/>
               <a:pPr/>
-              <a:t>1/17/2023</a:t>
+              <a:t>1/18/2023</a:t>
             </a:fld>
             <a:endParaRPr lang="en-US" dirty="0"/>
           </a:p>
@@ -2967,7 +2970,7 @@
             <a:fld id="{2F3E8B1C-86EF-43CF-8304-249481088644}" type="datetimeFigureOut">
               <a:rPr lang="en-US" smtClean="0"/>
               <a:pPr/>
-              <a:t>1/17/2023</a:t>
+              <a:t>1/18/2023</a:t>
             </a:fld>
             <a:endParaRPr lang="en-US" dirty="0"/>
           </a:p>
@@ -4103,7 +4106,7 @@
             <a:fld id="{2F3E8B1C-86EF-43CF-8304-249481088644}" type="datetimeFigureOut">
               <a:rPr lang="en-US" smtClean="0"/>
               <a:pPr/>
-              <a:t>1/17/2023</a:t>
+              <a:t>1/18/2023</a:t>
             </a:fld>
             <a:endParaRPr lang="en-US" dirty="0"/>
           </a:p>
@@ -5138,7 +5141,7 @@
             <a:fld id="{2F3E8B1C-86EF-43CF-8304-249481088644}" type="datetimeFigureOut">
               <a:rPr lang="en-US" smtClean="0"/>
               <a:pPr/>
-              <a:t>1/17/2023</a:t>
+              <a:t>1/18/2023</a:t>
             </a:fld>
             <a:endParaRPr lang="en-US" dirty="0"/>
           </a:p>
@@ -5800,7 +5803,7 @@
             <a:fld id="{2F3E8B1C-86EF-43CF-8304-249481088644}" type="datetimeFigureOut">
               <a:rPr lang="en-US" smtClean="0"/>
               <a:pPr/>
-              <a:t>1/17/2023</a:t>
+              <a:t>1/18/2023</a:t>
             </a:fld>
             <a:endParaRPr lang="en-US" dirty="0"/>
           </a:p>
@@ -6663,7 +6666,7 @@
             <a:fld id="{2F3E8B1C-86EF-43CF-8304-249481088644}" type="datetimeFigureOut">
               <a:rPr lang="en-US" smtClean="0"/>
               <a:pPr/>
-              <a:t>1/17/2023</a:t>
+              <a:t>1/18/2023</a:t>
             </a:fld>
             <a:endParaRPr lang="en-US" dirty="0"/>
           </a:p>
@@ -6854,7 +6857,7 @@
           <a:p>
             <a:fld id="{2F3E8B1C-86EF-43CF-8304-249481088644}" type="datetimeFigureOut">
               <a:rPr lang="en-US" smtClean="0"/>
-              <a:t>1/17/2023</a:t>
+              <a:t>1/18/2023</a:t>
             </a:fld>
             <a:endParaRPr lang="en-US"/>
           </a:p>
@@ -7826,7 +7829,7 @@
           <a:p>
             <a:fld id="{2F3E8B1C-86EF-43CF-8304-249481088644}" type="datetimeFigureOut">
               <a:rPr lang="en-US" smtClean="0"/>
-              <a:t>1/17/2023</a:t>
+              <a:t>1/18/2023</a:t>
             </a:fld>
             <a:endParaRPr lang="en-US"/>
           </a:p>
@@ -8037,7 +8040,7 @@
           <a:p>
             <a:fld id="{2F3E8B1C-86EF-43CF-8304-249481088644}" type="datetimeFigureOut">
               <a:rPr lang="en-US" smtClean="0"/>
-              <a:t>1/17/2023</a:t>
+              <a:t>1/18/2023</a:t>
             </a:fld>
             <a:endParaRPr lang="en-US"/>
           </a:p>
@@ -9071,7 +9074,7 @@
           <a:p>
             <a:fld id="{2F3E8B1C-86EF-43CF-8304-249481088644}" type="datetimeFigureOut">
               <a:rPr lang="en-US" smtClean="0"/>
-              <a:t>1/17/2023</a:t>
+              <a:t>1/18/2023</a:t>
             </a:fld>
             <a:endParaRPr lang="en-US"/>
           </a:p>
@@ -9343,7 +9346,7 @@
           <a:p>
             <a:fld id="{2F3E8B1C-86EF-43CF-8304-249481088644}" type="datetimeFigureOut">
               <a:rPr lang="en-US" smtClean="0"/>
-              <a:t>1/17/2023</a:t>
+              <a:t>1/18/2023</a:t>
             </a:fld>
             <a:endParaRPr lang="en-US"/>
           </a:p>
@@ -9753,7 +9756,7 @@
           <a:p>
             <a:fld id="{2F3E8B1C-86EF-43CF-8304-249481088644}" type="datetimeFigureOut">
               <a:rPr lang="en-US" smtClean="0"/>
-              <a:t>1/17/2023</a:t>
+              <a:t>1/18/2023</a:t>
             </a:fld>
             <a:endParaRPr lang="en-US"/>
           </a:p>
@@ -9880,7 +9883,7 @@
           <a:p>
             <a:fld id="{2F3E8B1C-86EF-43CF-8304-249481088644}" type="datetimeFigureOut">
               <a:rPr lang="en-US" smtClean="0"/>
-              <a:t>1/17/2023</a:t>
+              <a:t>1/18/2023</a:t>
             </a:fld>
             <a:endParaRPr lang="en-US"/>
           </a:p>
@@ -9975,7 +9978,7 @@
           <a:p>
             <a:fld id="{2F3E8B1C-86EF-43CF-8304-249481088644}" type="datetimeFigureOut">
               <a:rPr lang="en-US" smtClean="0"/>
-              <a:t>1/17/2023</a:t>
+              <a:t>1/18/2023</a:t>
             </a:fld>
             <a:endParaRPr lang="en-US"/>
           </a:p>
@@ -11056,7 +11059,7 @@
           <a:p>
             <a:fld id="{2F3E8B1C-86EF-43CF-8304-249481088644}" type="datetimeFigureOut">
               <a:rPr lang="en-US" smtClean="0"/>
-              <a:t>1/17/2023</a:t>
+              <a:t>1/18/2023</a:t>
             </a:fld>
             <a:endParaRPr lang="en-US"/>
           </a:p>
@@ -12164,7 +12167,7 @@
           <a:p>
             <a:fld id="{2F3E8B1C-86EF-43CF-8304-249481088644}" type="datetimeFigureOut">
               <a:rPr lang="en-US" smtClean="0"/>
-              <a:t>1/17/2023</a:t>
+              <a:t>1/18/2023</a:t>
             </a:fld>
             <a:endParaRPr lang="en-US"/>
           </a:p>
@@ -13162,7 +13165,7 @@
             <a:fld id="{2F3E8B1C-86EF-43CF-8304-249481088644}" type="datetimeFigureOut">
               <a:rPr lang="en-US" smtClean="0"/>
               <a:pPr/>
-              <a:t>1/17/2023</a:t>
+              <a:t>1/18/2023</a:t>
             </a:fld>
             <a:endParaRPr lang="en-US" dirty="0"/>
           </a:p>
@@ -13759,12 +13762,28 @@
           <a:lstStyle/>
           <a:p>
             <a:r>
+              <a:rPr lang="en-SG" sz="2800" b="1" dirty="0">
+                <a:solidFill>
+                  <a:schemeClr val="bg1"/>
+                </a:solidFill>
+              </a:rPr>
+              <a:t>Dragon</a:t>
+            </a:r>
+            <a:r>
               <a:rPr lang="en-SG" sz="3600" b="1" dirty="0">
                 <a:solidFill>
                   <a:schemeClr val="bg1"/>
                 </a:solidFill>
               </a:rPr>
-              <a:t>Dragon Power</a:t>
+              <a:t> P</a:t>
+            </a:r>
+            <a:r>
+              <a:rPr lang="en-SG" sz="2800" b="1" dirty="0">
+                <a:solidFill>
+                  <a:schemeClr val="bg1"/>
+                </a:solidFill>
+              </a:rPr>
+              <a:t>ower</a:t>
             </a:r>
           </a:p>
         </p:txBody>
@@ -16468,7 +16487,7 @@
         </p:blipFill>
         <p:spPr>
           <a:xfrm>
-            <a:off x="610438" y="1431992"/>
+            <a:off x="597729" y="1414619"/>
             <a:ext cx="2541169" cy="2092368"/>
           </a:xfrm>
         </p:spPr>
@@ -16501,7 +16520,7 @@
         </p:blipFill>
         <p:spPr>
           <a:xfrm>
-            <a:off x="3323352" y="1408151"/>
+            <a:off x="3328487" y="1414619"/>
             <a:ext cx="2570232" cy="2092368"/>
           </a:xfrm>
           <a:prstGeom prst="rect">
@@ -16511,10 +16530,10 @@
       </p:pic>
       <p:pic>
         <p:nvPicPr>
-          <p:cNvPr id="11" name="Picture 10" descr="Graphical user interface, text, application&#10;&#10;Description automatically generated">
+          <p:cNvPr id="16" name="Picture 15" descr="Graphical user interface, text, application&#10;&#10;Description automatically generated">
             <a:extLst>
               <a:ext uri="{FF2B5EF4-FFF2-40B4-BE49-F238E27FC236}">
-                <a16:creationId xmlns:a16="http://schemas.microsoft.com/office/drawing/2014/main" id="{35639604-7849-2EC4-669B-D59431E5566B}"/>
+                <a16:creationId xmlns:a16="http://schemas.microsoft.com/office/drawing/2014/main" id="{29E397B8-BB90-5A61-21F4-76A663E4C998}"/>
               </a:ext>
             </a:extLst>
           </p:cNvPr>
@@ -16537,8 +16556,8 @@
         </p:blipFill>
         <p:spPr>
           <a:xfrm>
-            <a:off x="6050461" y="1431992"/>
-            <a:ext cx="2570232" cy="2068527"/>
+            <a:off x="518202" y="3850567"/>
+            <a:ext cx="2526300" cy="2068527"/>
           </a:xfrm>
           <a:prstGeom prst="rect">
             <a:avLst/>
@@ -16547,10 +16566,10 @@
       </p:pic>
       <p:pic>
         <p:nvPicPr>
-          <p:cNvPr id="14" name="Picture 13" descr="Graphical user interface, application&#10;&#10;Description automatically generated">
+          <p:cNvPr id="4" name="Picture 3" descr="Graphical user interface, text, application&#10;&#10;Description automatically generated">
             <a:extLst>
               <a:ext uri="{FF2B5EF4-FFF2-40B4-BE49-F238E27FC236}">
-                <a16:creationId xmlns:a16="http://schemas.microsoft.com/office/drawing/2014/main" id="{4A6CEE77-66FF-8E47-3642-82367C1F03E9}"/>
+                <a16:creationId xmlns:a16="http://schemas.microsoft.com/office/drawing/2014/main" id="{10715A72-7ED7-636E-421F-A3E91E0D5C26}"/>
               </a:ext>
             </a:extLst>
           </p:cNvPr>
@@ -16573,8 +16592,8 @@
         </p:blipFill>
         <p:spPr>
           <a:xfrm>
-            <a:off x="8792438" y="1431992"/>
-            <a:ext cx="2657882" cy="2068527"/>
+            <a:off x="6099175" y="1408152"/>
+            <a:ext cx="2724408" cy="2092368"/>
           </a:xfrm>
           <a:prstGeom prst="rect">
             <a:avLst/>
@@ -16583,10 +16602,10 @@
       </p:pic>
       <p:pic>
         <p:nvPicPr>
-          <p:cNvPr id="16" name="Picture 15" descr="Graphical user interface, text, application&#10;&#10;Description automatically generated">
+          <p:cNvPr id="9" name="Picture 8" descr="Graphical user interface&#10;&#10;Description automatically generated">
             <a:extLst>
               <a:ext uri="{FF2B5EF4-FFF2-40B4-BE49-F238E27FC236}">
-                <a16:creationId xmlns:a16="http://schemas.microsoft.com/office/drawing/2014/main" id="{29E397B8-BB90-5A61-21F4-76A663E4C998}"/>
+                <a16:creationId xmlns:a16="http://schemas.microsoft.com/office/drawing/2014/main" id="{62277025-B9EB-2801-5049-ECF8313A861C}"/>
               </a:ext>
             </a:extLst>
           </p:cNvPr>
@@ -16609,8 +16628,44 @@
         </p:blipFill>
         <p:spPr>
           <a:xfrm>
-            <a:off x="625307" y="3850567"/>
-            <a:ext cx="2541168" cy="2068527"/>
+            <a:off x="9024039" y="1408184"/>
+            <a:ext cx="2570232" cy="2092336"/>
+          </a:xfrm>
+          <a:prstGeom prst="rect">
+            <a:avLst/>
+          </a:prstGeom>
+        </p:spPr>
+      </p:pic>
+      <p:pic>
+        <p:nvPicPr>
+          <p:cNvPr id="15" name="Picture 14" descr="Graphical user interface&#10;&#10;Description automatically generated">
+            <a:extLst>
+              <a:ext uri="{FF2B5EF4-FFF2-40B4-BE49-F238E27FC236}">
+                <a16:creationId xmlns:a16="http://schemas.microsoft.com/office/drawing/2014/main" id="{C7CD156C-6E14-23ED-84B4-2725475B5283}"/>
+              </a:ext>
+            </a:extLst>
+          </p:cNvPr>
+          <p:cNvPicPr>
+            <a:picLocks noChangeAspect="1"/>
+          </p:cNvPicPr>
+          <p:nvPr/>
+        </p:nvPicPr>
+        <p:blipFill>
+          <a:blip r:embed="rId8">
+            <a:extLst>
+              <a:ext uri="{28A0092B-C50C-407E-A947-70E740481C1C}">
+                <a14:useLocalDpi xmlns:a14="http://schemas.microsoft.com/office/drawing/2010/main" val="0"/>
+              </a:ext>
+            </a:extLst>
+          </a:blip>
+          <a:stretch>
+            <a:fillRect/>
+          </a:stretch>
+        </p:blipFill>
+        <p:spPr>
+          <a:xfrm>
+            <a:off x="3200146" y="3837918"/>
+            <a:ext cx="2633405" cy="2068527"/>
           </a:xfrm>
           <a:prstGeom prst="rect">
             <a:avLst/>
@@ -16819,7 +16874,7 @@
         </p:nvSpPr>
         <p:spPr>
           <a:xfrm>
-            <a:off x="967790" y="1449324"/>
+            <a:off x="1068388" y="768534"/>
             <a:ext cx="9206785" cy="748931"/>
           </a:xfrm>
         </p:spPr>
@@ -17263,8 +17318,8 @@
         </p:nvSpPr>
         <p:spPr>
           <a:xfrm>
-            <a:off x="2327993" y="1477033"/>
-            <a:ext cx="7139279" cy="4391640"/>
+            <a:off x="2168517" y="2239033"/>
+            <a:ext cx="7139279" cy="1459207"/>
           </a:xfrm>
         </p:spPr>
         <p:txBody>
@@ -17526,14 +17581,14 @@
           <a:lstStyle/>
           <a:p>
             <a:r>
-              <a:rPr lang="ru-RU" sz="2800" dirty="0">
+              <a:rPr lang="ru-RU" sz="2800" b="1" dirty="0">
                 <a:solidFill>
                   <a:schemeClr val="tx1"/>
                 </a:solidFill>
               </a:rPr>
               <a:t>Ссылка на проект в гитхабе:</a:t>
             </a:r>
-            <a:endParaRPr lang="en-SG" sz="2800" dirty="0">
+            <a:endParaRPr lang="en-SG" sz="2800" b="1" dirty="0">
               <a:solidFill>
                 <a:schemeClr val="tx1"/>
               </a:solidFill>

</xml_diff>

<commit_message>
presentation is almost ready
</commit_message>
<xml_diff>
--- a/presentation.pptx
+++ b/presentation.pptx
@@ -16157,8 +16157,8 @@
         </p:nvSpPr>
         <p:spPr>
           <a:xfrm>
-            <a:off x="2185753" y="1581404"/>
-            <a:ext cx="6230220" cy="4391640"/>
+            <a:off x="2185752" y="1581404"/>
+            <a:ext cx="8937859" cy="4391640"/>
           </a:xfrm>
         </p:spPr>
         <p:txBody>
@@ -16167,6 +16167,188 @@
           </a:bodyPr>
           <a:lstStyle/>
           <a:p>
+            <a:r>
+              <a:rPr lang="ru-RU" dirty="0">
+                <a:solidFill>
+                  <a:schemeClr val="tx1"/>
+                </a:solidFill>
+              </a:rPr>
+              <a:t>При нажатии кнопки </a:t>
+            </a:r>
+            <a:r>
+              <a:rPr lang="en-SG" dirty="0">
+                <a:solidFill>
+                  <a:schemeClr val="tx1"/>
+                </a:solidFill>
+              </a:rPr>
+              <a:t>“Play” </a:t>
+            </a:r>
+            <a:r>
+              <a:rPr lang="ru-RU" dirty="0">
+                <a:solidFill>
+                  <a:schemeClr val="tx1"/>
+                </a:solidFill>
+              </a:rPr>
+              <a:t>запускается очень важная часть программы </a:t>
+            </a:r>
+            <a:r>
+              <a:rPr lang="en-SG" dirty="0">
+                <a:solidFill>
+                  <a:schemeClr val="tx1"/>
+                </a:solidFill>
+              </a:rPr>
+              <a:t>“</a:t>
+            </a:r>
+            <a:r>
+              <a:rPr lang="en-SG" dirty="0" err="1">
+                <a:solidFill>
+                  <a:schemeClr val="tx1"/>
+                </a:solidFill>
+              </a:rPr>
+              <a:t>dragonfight</a:t>
+            </a:r>
+            <a:r>
+              <a:rPr lang="en-SG" dirty="0">
+                <a:solidFill>
+                  <a:schemeClr val="tx1"/>
+                </a:solidFill>
+              </a:rPr>
+              <a:t> ”. </a:t>
+            </a:r>
+            <a:r>
+              <a:rPr lang="ru-RU" dirty="0">
+                <a:solidFill>
+                  <a:schemeClr val="tx1"/>
+                </a:solidFill>
+              </a:rPr>
+              <a:t>Здесь реализован бой драконов. Выбранный по кнопке </a:t>
+            </a:r>
+            <a:r>
+              <a:rPr lang="en-SG" dirty="0">
+                <a:solidFill>
+                  <a:schemeClr val="tx1"/>
+                </a:solidFill>
+              </a:rPr>
+              <a:t>“Select level” </a:t>
+            </a:r>
+            <a:r>
+              <a:rPr lang="ru-RU" dirty="0">
+                <a:solidFill>
+                  <a:schemeClr val="tx1"/>
+                </a:solidFill>
+              </a:rPr>
+              <a:t>уровень передаётся и загружается в </a:t>
+            </a:r>
+            <a:r>
+              <a:rPr lang="en-SG" dirty="0">
+                <a:solidFill>
+                  <a:schemeClr val="tx1"/>
+                </a:solidFill>
+              </a:rPr>
+              <a:t>“</a:t>
+            </a:r>
+            <a:r>
+              <a:rPr lang="en-SG" dirty="0" err="1">
+                <a:solidFill>
+                  <a:schemeClr val="tx1"/>
+                </a:solidFill>
+              </a:rPr>
+              <a:t>dragonfight</a:t>
+            </a:r>
+            <a:r>
+              <a:rPr lang="en-SG" dirty="0">
+                <a:solidFill>
+                  <a:schemeClr val="tx1"/>
+                </a:solidFill>
+              </a:rPr>
+              <a:t> ”. </a:t>
+            </a:r>
+            <a:r>
+              <a:rPr lang="ru-RU" dirty="0">
+                <a:solidFill>
+                  <a:schemeClr val="tx1"/>
+                </a:solidFill>
+              </a:rPr>
+              <a:t>Далее берётся выбраный игроком дракон, и ему назначается соперник.</a:t>
+            </a:r>
+          </a:p>
+          <a:p>
+            <a:r>
+              <a:rPr lang="ru-RU" dirty="0">
+                <a:solidFill>
+                  <a:schemeClr val="tx1"/>
+                </a:solidFill>
+              </a:rPr>
+              <a:t>В процессе битвы уменьшается </a:t>
+            </a:r>
+            <a:r>
+              <a:rPr lang="en-SG" dirty="0">
+                <a:solidFill>
+                  <a:schemeClr val="tx1"/>
+                </a:solidFill>
+              </a:rPr>
+              <a:t>hp </a:t>
+            </a:r>
+            <a:r>
+              <a:rPr lang="ru-RU" dirty="0">
+                <a:solidFill>
+                  <a:schemeClr val="tx1"/>
+                </a:solidFill>
+              </a:rPr>
+              <a:t>драконов после каждого попадания в драконов оружием соперника.</a:t>
+            </a:r>
+          </a:p>
+          <a:p>
+            <a:r>
+              <a:rPr lang="ru-RU" dirty="0">
+                <a:solidFill>
+                  <a:schemeClr val="tx1"/>
+                </a:solidFill>
+              </a:rPr>
+              <a:t>Также присутствует аккомпанемент к игре. На время боя включается соответствующая музыка, которая выключается по его окончании.</a:t>
+            </a:r>
+          </a:p>
+          <a:p>
+            <a:r>
+              <a:rPr lang="ru-RU" dirty="0">
+                <a:solidFill>
+                  <a:schemeClr val="tx1"/>
+                </a:solidFill>
+              </a:rPr>
+              <a:t>В конце боя результаты отображаются в финальном окне, и при каждой следующей игре начисляется </a:t>
+            </a:r>
+            <a:r>
+              <a:rPr lang="en-SG" dirty="0">
+                <a:solidFill>
+                  <a:schemeClr val="tx1"/>
+                </a:solidFill>
+              </a:rPr>
+              <a:t>“</a:t>
+            </a:r>
+            <a:r>
+              <a:rPr lang="ru-RU" dirty="0">
+                <a:solidFill>
+                  <a:schemeClr val="tx1"/>
+                </a:solidFill>
+              </a:rPr>
+              <a:t>+100</a:t>
+            </a:r>
+            <a:r>
+              <a:rPr lang="en-SG" dirty="0">
+                <a:solidFill>
+                  <a:schemeClr val="tx1"/>
+                </a:solidFill>
+              </a:rPr>
+              <a:t>”</a:t>
+            </a:r>
+            <a:r>
+              <a:rPr lang="ru-RU" dirty="0">
+                <a:solidFill>
+                  <a:schemeClr val="tx1"/>
+                </a:solidFill>
+              </a:rPr>
+              <a:t> Драконьих колец (денег), которые можно обменять на различных персонажей.</a:t>
+            </a:r>
             <a:endParaRPr lang="en-SG" dirty="0">
               <a:solidFill>
                 <a:schemeClr val="tx1"/>
@@ -16666,6 +16848,42 @@
           <a:xfrm>
             <a:off x="3200146" y="3837918"/>
             <a:ext cx="2633405" cy="2068527"/>
+          </a:xfrm>
+          <a:prstGeom prst="rect">
+            <a:avLst/>
+          </a:prstGeom>
+        </p:spPr>
+      </p:pic>
+      <p:pic>
+        <p:nvPicPr>
+          <p:cNvPr id="18" name="Picture 17" descr="A screenshot of a video game&#10;&#10;Description automatically generated">
+            <a:extLst>
+              <a:ext uri="{FF2B5EF4-FFF2-40B4-BE49-F238E27FC236}">
+                <a16:creationId xmlns:a16="http://schemas.microsoft.com/office/drawing/2014/main" id="{BDE05DF0-9818-98E9-5AC5-F09CCF0F4FE6}"/>
+              </a:ext>
+            </a:extLst>
+          </p:cNvPr>
+          <p:cNvPicPr>
+            <a:picLocks noChangeAspect="1"/>
+          </p:cNvPicPr>
+          <p:nvPr/>
+        </p:nvPicPr>
+        <p:blipFill>
+          <a:blip r:embed="rId9">
+            <a:extLst>
+              <a:ext uri="{28A0092B-C50C-407E-A947-70E740481C1C}">
+                <a14:useLocalDpi xmlns:a14="http://schemas.microsoft.com/office/drawing/2010/main" val="0"/>
+              </a:ext>
+            </a:extLst>
+          </a:blip>
+          <a:stretch>
+            <a:fillRect/>
+          </a:stretch>
+        </p:blipFill>
+        <p:spPr>
+          <a:xfrm>
+            <a:off x="6096000" y="3850566"/>
+            <a:ext cx="2724408" cy="2068527"/>
           </a:xfrm>
           <a:prstGeom prst="rect">
             <a:avLst/>

</xml_diff>